<commit_message>
Added image of implementation chapter, execution chapter #1817
</commit_message>
<xml_diff>
--- a/source/UnitTest/images_UnitTestGuide/materialUnitTestGuide.pptx
+++ b/source/UnitTest/images_UnitTestGuide/materialUnitTestGuide.pptx
@@ -5,7 +5,7 @@
     <p:sldMasterId id="2147483648" r:id="rId1"/>
   </p:sldMasterIdLst>
   <p:notesMasterIdLst>
-    <p:notesMasterId r:id="rId10"/>
+    <p:notesMasterId r:id="rId29"/>
   </p:notesMasterIdLst>
   <p:sldIdLst>
     <p:sldId id="335" r:id="rId2"/>
@@ -16,6 +16,25 @@
     <p:sldId id="339" r:id="rId7"/>
     <p:sldId id="340" r:id="rId8"/>
     <p:sldId id="341" r:id="rId9"/>
+    <p:sldId id="342" r:id="rId10"/>
+    <p:sldId id="343" r:id="rId11"/>
+    <p:sldId id="344" r:id="rId12"/>
+    <p:sldId id="345" r:id="rId13"/>
+    <p:sldId id="346" r:id="rId14"/>
+    <p:sldId id="347" r:id="rId15"/>
+    <p:sldId id="349" r:id="rId16"/>
+    <p:sldId id="348" r:id="rId17"/>
+    <p:sldId id="351" r:id="rId18"/>
+    <p:sldId id="352" r:id="rId19"/>
+    <p:sldId id="353" r:id="rId20"/>
+    <p:sldId id="356" r:id="rId21"/>
+    <p:sldId id="355" r:id="rId22"/>
+    <p:sldId id="357" r:id="rId23"/>
+    <p:sldId id="358" r:id="rId24"/>
+    <p:sldId id="361" r:id="rId25"/>
+    <p:sldId id="359" r:id="rId26"/>
+    <p:sldId id="360" r:id="rId27"/>
+    <p:sldId id="362" r:id="rId28"/>
   </p:sldIdLst>
   <p:sldSz cx="9144000" cy="6858000" type="screen4x3"/>
   <p:notesSz cx="6858000" cy="9144000"/>
@@ -131,6 +150,25 @@
             <p14:sldId id="339"/>
             <p14:sldId id="340"/>
             <p14:sldId id="341"/>
+            <p14:sldId id="342"/>
+            <p14:sldId id="343"/>
+            <p14:sldId id="344"/>
+            <p14:sldId id="345"/>
+            <p14:sldId id="346"/>
+            <p14:sldId id="347"/>
+            <p14:sldId id="349"/>
+            <p14:sldId id="348"/>
+            <p14:sldId id="351"/>
+            <p14:sldId id="352"/>
+            <p14:sldId id="353"/>
+            <p14:sldId id="356"/>
+            <p14:sldId id="355"/>
+            <p14:sldId id="357"/>
+            <p14:sldId id="358"/>
+            <p14:sldId id="361"/>
+            <p14:sldId id="359"/>
+            <p14:sldId id="360"/>
+            <p14:sldId id="362"/>
           </p14:sldIdLst>
         </p14:section>
       </p14:sectionLst>
@@ -235,7 +273,7 @@
           <a:p>
             <a:fld id="{3BB47352-BF5A-4CD2-B029-996118CD8E01}" type="datetimeFigureOut">
               <a:rPr kumimoji="1" lang="ja-JP" altLang="en-US" smtClean="0"/>
-              <a:t>2017/9/14</a:t>
+              <a:t>2017/9/25</a:t>
             </a:fld>
             <a:endParaRPr kumimoji="1" lang="ja-JP" altLang="en-US"/>
           </a:p>
@@ -1388,7 +1426,7 @@
           <a:p>
             <a:fld id="{7B9B12EC-6AA0-374B-A2D3-850081A07A26}" type="datetimeFigureOut">
               <a:rPr kumimoji="1" lang="ja-JP" altLang="en-US" smtClean="0"/>
-              <a:t>2017/9/14</a:t>
+              <a:t>2017/9/25</a:t>
             </a:fld>
             <a:endParaRPr kumimoji="1" lang="ja-JP" altLang="en-US"/>
           </a:p>
@@ -1590,7 +1628,7 @@
           <a:p>
             <a:fld id="{7B9B12EC-6AA0-374B-A2D3-850081A07A26}" type="datetimeFigureOut">
               <a:rPr kumimoji="1" lang="ja-JP" altLang="en-US" smtClean="0"/>
-              <a:t>2017/9/14</a:t>
+              <a:t>2017/9/25</a:t>
             </a:fld>
             <a:endParaRPr kumimoji="1" lang="ja-JP" altLang="en-US"/>
           </a:p>
@@ -1802,7 +1840,7 @@
           <a:p>
             <a:fld id="{7B9B12EC-6AA0-374B-A2D3-850081A07A26}" type="datetimeFigureOut">
               <a:rPr kumimoji="1" lang="ja-JP" altLang="en-US" smtClean="0"/>
-              <a:t>2017/9/14</a:t>
+              <a:t>2017/9/25</a:t>
             </a:fld>
             <a:endParaRPr kumimoji="1" lang="ja-JP" altLang="en-US"/>
           </a:p>
@@ -2004,7 +2042,7 @@
           <a:p>
             <a:fld id="{7B9B12EC-6AA0-374B-A2D3-850081A07A26}" type="datetimeFigureOut">
               <a:rPr kumimoji="1" lang="ja-JP" altLang="en-US" smtClean="0"/>
-              <a:t>2017/9/14</a:t>
+              <a:t>2017/9/25</a:t>
             </a:fld>
             <a:endParaRPr kumimoji="1" lang="ja-JP" altLang="en-US"/>
           </a:p>
@@ -2250,7 +2288,7 @@
           <a:p>
             <a:fld id="{7B9B12EC-6AA0-374B-A2D3-850081A07A26}" type="datetimeFigureOut">
               <a:rPr kumimoji="1" lang="ja-JP" altLang="en-US" smtClean="0"/>
-              <a:t>2017/9/14</a:t>
+              <a:t>2017/9/25</a:t>
             </a:fld>
             <a:endParaRPr kumimoji="1" lang="ja-JP" altLang="en-US"/>
           </a:p>
@@ -2602,7 +2640,7 @@
           <a:p>
             <a:fld id="{7B9B12EC-6AA0-374B-A2D3-850081A07A26}" type="datetimeFigureOut">
               <a:rPr kumimoji="1" lang="ja-JP" altLang="en-US" smtClean="0"/>
-              <a:t>2017/9/14</a:t>
+              <a:t>2017/9/25</a:t>
             </a:fld>
             <a:endParaRPr kumimoji="1" lang="ja-JP" altLang="en-US"/>
           </a:p>
@@ -3088,7 +3126,7 @@
           <a:p>
             <a:fld id="{7B9B12EC-6AA0-374B-A2D3-850081A07A26}" type="datetimeFigureOut">
               <a:rPr kumimoji="1" lang="ja-JP" altLang="en-US" smtClean="0"/>
-              <a:t>2017/9/14</a:t>
+              <a:t>2017/9/25</a:t>
             </a:fld>
             <a:endParaRPr kumimoji="1" lang="ja-JP" altLang="en-US"/>
           </a:p>
@@ -3206,7 +3244,7 @@
           <a:p>
             <a:fld id="{7B9B12EC-6AA0-374B-A2D3-850081A07A26}" type="datetimeFigureOut">
               <a:rPr kumimoji="1" lang="ja-JP" altLang="en-US" smtClean="0"/>
-              <a:t>2017/9/14</a:t>
+              <a:t>2017/9/25</a:t>
             </a:fld>
             <a:endParaRPr kumimoji="1" lang="ja-JP" altLang="en-US"/>
           </a:p>
@@ -3301,7 +3339,7 @@
           <a:p>
             <a:fld id="{7B9B12EC-6AA0-374B-A2D3-850081A07A26}" type="datetimeFigureOut">
               <a:rPr kumimoji="1" lang="ja-JP" altLang="en-US" smtClean="0"/>
-              <a:t>2017/9/14</a:t>
+              <a:t>2017/9/25</a:t>
             </a:fld>
             <a:endParaRPr kumimoji="1" lang="ja-JP" altLang="en-US"/>
           </a:p>
@@ -3610,7 +3648,7 @@
           <a:p>
             <a:fld id="{7B9B12EC-6AA0-374B-A2D3-850081A07A26}" type="datetimeFigureOut">
               <a:rPr kumimoji="1" lang="ja-JP" altLang="en-US" smtClean="0"/>
-              <a:t>2017/9/14</a:t>
+              <a:t>2017/9/25</a:t>
             </a:fld>
             <a:endParaRPr kumimoji="1" lang="ja-JP" altLang="en-US"/>
           </a:p>
@@ -3863,7 +3901,7 @@
           <a:p>
             <a:fld id="{7B9B12EC-6AA0-374B-A2D3-850081A07A26}" type="datetimeFigureOut">
               <a:rPr kumimoji="1" lang="ja-JP" altLang="en-US" smtClean="0"/>
-              <a:t>2017/9/14</a:t>
+              <a:t>2017/9/25</a:t>
             </a:fld>
             <a:endParaRPr kumimoji="1" lang="ja-JP" altLang="en-US"/>
           </a:p>
@@ -4108,7 +4146,7 @@
           <a:p>
             <a:fld id="{7B9B12EC-6AA0-374B-A2D3-850081A07A26}" type="datetimeFigureOut">
               <a:rPr kumimoji="1" lang="ja-JP" altLang="en-US" smtClean="0"/>
-              <a:t>2017/9/14</a:t>
+              <a:t>2017/9/25</a:t>
             </a:fld>
             <a:endParaRPr kumimoji="1" lang="ja-JP" altLang="en-US"/>
           </a:p>
@@ -5211,6 +5249,1141 @@
 </p:sld>
 </file>
 
+<file path=ppt/slides/slide10.xml><?xml version="1.0" encoding="utf-8"?>
+<p:sld xmlns:a="http://schemas.openxmlformats.org/drawingml/2006/main" xmlns:r="http://schemas.openxmlformats.org/officeDocument/2006/relationships" xmlns:p="http://schemas.openxmlformats.org/presentationml/2006/main">
+  <p:cSld>
+    <p:spTree>
+      <p:nvGrpSpPr>
+        <p:cNvPr id="1" name=""/>
+        <p:cNvGrpSpPr/>
+        <p:nvPr/>
+      </p:nvGrpSpPr>
+      <p:grpSpPr>
+        <a:xfrm>
+          <a:off x="0" y="0"/>
+          <a:ext cx="0" cy="0"/>
+          <a:chOff x="0" y="0"/>
+          <a:chExt cx="0" cy="0"/>
+        </a:xfrm>
+      </p:grpSpPr>
+      <p:pic>
+        <p:nvPicPr>
+          <p:cNvPr id="4" name="図 3"/>
+          <p:cNvPicPr>
+            <a:picLocks noChangeAspect="1"/>
+          </p:cNvPicPr>
+          <p:nvPr/>
+        </p:nvPicPr>
+        <p:blipFill>
+          <a:blip r:embed="rId2"/>
+          <a:stretch>
+            <a:fillRect/>
+          </a:stretch>
+        </p:blipFill>
+        <p:spPr>
+          <a:xfrm>
+            <a:off x="1557253" y="968468"/>
+            <a:ext cx="5717884" cy="5055813"/>
+          </a:xfrm>
+          <a:prstGeom prst="rect">
+            <a:avLst/>
+          </a:prstGeom>
+        </p:spPr>
+      </p:pic>
+      <p:sp>
+        <p:nvSpPr>
+          <p:cNvPr id="8" name="正方形/長方形 7"/>
+          <p:cNvSpPr/>
+          <p:nvPr/>
+        </p:nvSpPr>
+        <p:spPr>
+          <a:xfrm>
+            <a:off x="3314067" y="2617694"/>
+            <a:ext cx="3803909" cy="376518"/>
+          </a:xfrm>
+          <a:prstGeom prst="rect">
+            <a:avLst/>
+          </a:prstGeom>
+          <a:noFill/>
+          <a:ln w="57150">
+            <a:solidFill>
+              <a:srgbClr val="FF0000"/>
+            </a:solidFill>
+          </a:ln>
+        </p:spPr>
+        <p:style>
+          <a:lnRef idx="1">
+            <a:schemeClr val="accent1"/>
+          </a:lnRef>
+          <a:fillRef idx="3">
+            <a:schemeClr val="accent1"/>
+          </a:fillRef>
+          <a:effectRef idx="2">
+            <a:schemeClr val="accent1"/>
+          </a:effectRef>
+          <a:fontRef idx="minor">
+            <a:schemeClr val="lt1"/>
+          </a:fontRef>
+        </p:style>
+        <p:txBody>
+          <a:bodyPr rtlCol="0" anchor="ctr"/>
+          <a:lstStyle/>
+          <a:p>
+            <a:pPr algn="ctr"/>
+            <a:endParaRPr kumimoji="1" lang="ja-JP" altLang="en-US" dirty="0">
+              <a:solidFill>
+                <a:srgbClr val="FF0000"/>
+              </a:solidFill>
+            </a:endParaRPr>
+          </a:p>
+        </p:txBody>
+      </p:sp>
+      <p:pic>
+        <p:nvPicPr>
+          <p:cNvPr id="12" name="図 11"/>
+          <p:cNvPicPr>
+            <a:picLocks noChangeAspect="1"/>
+          </p:cNvPicPr>
+          <p:nvPr/>
+        </p:nvPicPr>
+        <p:blipFill>
+          <a:blip r:embed="rId3"/>
+          <a:stretch>
+            <a:fillRect/>
+          </a:stretch>
+        </p:blipFill>
+        <p:spPr>
+          <a:xfrm>
+            <a:off x="2936246" y="5564684"/>
+            <a:ext cx="3464553" cy="459597"/>
+          </a:xfrm>
+          <a:prstGeom prst="rect">
+            <a:avLst/>
+          </a:prstGeom>
+        </p:spPr>
+      </p:pic>
+      <p:sp>
+        <p:nvSpPr>
+          <p:cNvPr id="13" name="正方形/長方形 12"/>
+          <p:cNvSpPr/>
+          <p:nvPr/>
+        </p:nvSpPr>
+        <p:spPr>
+          <a:xfrm>
+            <a:off x="3007961" y="4276303"/>
+            <a:ext cx="4181731" cy="869438"/>
+          </a:xfrm>
+          <a:prstGeom prst="rect">
+            <a:avLst/>
+          </a:prstGeom>
+          <a:noFill/>
+          <a:ln w="57150">
+            <a:solidFill>
+              <a:srgbClr val="FF0000"/>
+            </a:solidFill>
+          </a:ln>
+        </p:spPr>
+        <p:style>
+          <a:lnRef idx="1">
+            <a:schemeClr val="accent1"/>
+          </a:lnRef>
+          <a:fillRef idx="3">
+            <a:schemeClr val="accent1"/>
+          </a:fillRef>
+          <a:effectRef idx="2">
+            <a:schemeClr val="accent1"/>
+          </a:effectRef>
+          <a:fontRef idx="minor">
+            <a:schemeClr val="lt1"/>
+          </a:fontRef>
+        </p:style>
+        <p:txBody>
+          <a:bodyPr rtlCol="0" anchor="ctr"/>
+          <a:lstStyle/>
+          <a:p>
+            <a:pPr algn="ctr"/>
+            <a:endParaRPr kumimoji="1" lang="ja-JP" altLang="en-US" dirty="0">
+              <a:solidFill>
+                <a:srgbClr val="FF0000"/>
+              </a:solidFill>
+            </a:endParaRPr>
+          </a:p>
+        </p:txBody>
+      </p:sp>
+    </p:spTree>
+    <p:extLst>
+      <p:ext uri="{BB962C8B-B14F-4D97-AF65-F5344CB8AC3E}">
+        <p14:creationId xmlns:p14="http://schemas.microsoft.com/office/powerpoint/2010/main" val="1111708162"/>
+      </p:ext>
+    </p:extLst>
+  </p:cSld>
+  <p:clrMapOvr>
+    <a:masterClrMapping/>
+  </p:clrMapOvr>
+</p:sld>
+</file>
+
+<file path=ppt/slides/slide11.xml><?xml version="1.0" encoding="utf-8"?>
+<p:sld xmlns:a="http://schemas.openxmlformats.org/drawingml/2006/main" xmlns:r="http://schemas.openxmlformats.org/officeDocument/2006/relationships" xmlns:p="http://schemas.openxmlformats.org/presentationml/2006/main">
+  <p:cSld>
+    <p:spTree>
+      <p:nvGrpSpPr>
+        <p:cNvPr id="1" name=""/>
+        <p:cNvGrpSpPr/>
+        <p:nvPr/>
+      </p:nvGrpSpPr>
+      <p:grpSpPr>
+        <a:xfrm>
+          <a:off x="0" y="0"/>
+          <a:ext cx="0" cy="0"/>
+          <a:chOff x="0" y="0"/>
+          <a:chExt cx="0" cy="0"/>
+        </a:xfrm>
+      </p:grpSpPr>
+      <p:pic>
+        <p:nvPicPr>
+          <p:cNvPr id="3" name="図 2"/>
+          <p:cNvPicPr>
+            <a:picLocks noChangeAspect="1"/>
+          </p:cNvPicPr>
+          <p:nvPr/>
+        </p:nvPicPr>
+        <p:blipFill rotWithShape="1">
+          <a:blip r:embed="rId2"/>
+          <a:srcRect r="-2153"/>
+          <a:stretch/>
+        </p:blipFill>
+        <p:spPr>
+          <a:xfrm>
+            <a:off x="1316977" y="1995475"/>
+            <a:ext cx="6805047" cy="3360108"/>
+          </a:xfrm>
+          <a:prstGeom prst="rect">
+            <a:avLst/>
+          </a:prstGeom>
+        </p:spPr>
+      </p:pic>
+      <p:sp>
+        <p:nvSpPr>
+          <p:cNvPr id="8" name="正方形/長方形 7"/>
+          <p:cNvSpPr/>
+          <p:nvPr/>
+        </p:nvSpPr>
+        <p:spPr>
+          <a:xfrm>
+            <a:off x="2812937" y="3244195"/>
+            <a:ext cx="5165651" cy="371770"/>
+          </a:xfrm>
+          <a:prstGeom prst="rect">
+            <a:avLst/>
+          </a:prstGeom>
+          <a:noFill/>
+          <a:ln w="57150">
+            <a:solidFill>
+              <a:srgbClr val="FF0000"/>
+            </a:solidFill>
+          </a:ln>
+        </p:spPr>
+        <p:style>
+          <a:lnRef idx="1">
+            <a:schemeClr val="accent1"/>
+          </a:lnRef>
+          <a:fillRef idx="3">
+            <a:schemeClr val="accent1"/>
+          </a:fillRef>
+          <a:effectRef idx="2">
+            <a:schemeClr val="accent1"/>
+          </a:effectRef>
+          <a:fontRef idx="minor">
+            <a:schemeClr val="lt1"/>
+          </a:fontRef>
+        </p:style>
+        <p:txBody>
+          <a:bodyPr rtlCol="0" anchor="ctr"/>
+          <a:lstStyle/>
+          <a:p>
+            <a:pPr algn="ctr"/>
+            <a:endParaRPr kumimoji="1" lang="ja-JP" altLang="en-US" dirty="0">
+              <a:solidFill>
+                <a:srgbClr val="FF0000"/>
+              </a:solidFill>
+            </a:endParaRPr>
+          </a:p>
+        </p:txBody>
+      </p:sp>
+      <p:sp>
+        <p:nvSpPr>
+          <p:cNvPr id="13" name="正方形/長方形 12"/>
+          <p:cNvSpPr/>
+          <p:nvPr/>
+        </p:nvSpPr>
+        <p:spPr>
+          <a:xfrm>
+            <a:off x="2707340" y="4864685"/>
+            <a:ext cx="2510117" cy="340658"/>
+          </a:xfrm>
+          <a:prstGeom prst="rect">
+            <a:avLst/>
+          </a:prstGeom>
+          <a:noFill/>
+          <a:ln w="57150">
+            <a:solidFill>
+              <a:srgbClr val="FF0000"/>
+            </a:solidFill>
+          </a:ln>
+        </p:spPr>
+        <p:style>
+          <a:lnRef idx="1">
+            <a:schemeClr val="accent1"/>
+          </a:lnRef>
+          <a:fillRef idx="3">
+            <a:schemeClr val="accent1"/>
+          </a:fillRef>
+          <a:effectRef idx="2">
+            <a:schemeClr val="accent1"/>
+          </a:effectRef>
+          <a:fontRef idx="minor">
+            <a:schemeClr val="lt1"/>
+          </a:fontRef>
+        </p:style>
+        <p:txBody>
+          <a:bodyPr rtlCol="0" anchor="ctr"/>
+          <a:lstStyle/>
+          <a:p>
+            <a:pPr algn="ctr"/>
+            <a:endParaRPr kumimoji="1" lang="ja-JP" altLang="en-US" dirty="0">
+              <a:solidFill>
+                <a:srgbClr val="FF0000"/>
+              </a:solidFill>
+            </a:endParaRPr>
+          </a:p>
+        </p:txBody>
+      </p:sp>
+    </p:spTree>
+    <p:extLst>
+      <p:ext uri="{BB962C8B-B14F-4D97-AF65-F5344CB8AC3E}">
+        <p14:creationId xmlns:p14="http://schemas.microsoft.com/office/powerpoint/2010/main" val="3338482297"/>
+      </p:ext>
+    </p:extLst>
+  </p:cSld>
+  <p:clrMapOvr>
+    <a:masterClrMapping/>
+  </p:clrMapOvr>
+</p:sld>
+</file>
+
+<file path=ppt/slides/slide12.xml><?xml version="1.0" encoding="utf-8"?>
+<p:sld xmlns:a="http://schemas.openxmlformats.org/drawingml/2006/main" xmlns:r="http://schemas.openxmlformats.org/officeDocument/2006/relationships" xmlns:p="http://schemas.openxmlformats.org/presentationml/2006/main">
+  <p:cSld>
+    <p:spTree>
+      <p:nvGrpSpPr>
+        <p:cNvPr id="1" name=""/>
+        <p:cNvGrpSpPr/>
+        <p:nvPr/>
+      </p:nvGrpSpPr>
+      <p:grpSpPr>
+        <a:xfrm>
+          <a:off x="0" y="0"/>
+          <a:ext cx="0" cy="0"/>
+          <a:chOff x="0" y="0"/>
+          <a:chExt cx="0" cy="0"/>
+        </a:xfrm>
+      </p:grpSpPr>
+      <p:pic>
+        <p:nvPicPr>
+          <p:cNvPr id="2" name="図 1"/>
+          <p:cNvPicPr>
+            <a:picLocks noChangeAspect="1"/>
+          </p:cNvPicPr>
+          <p:nvPr/>
+        </p:nvPicPr>
+        <p:blipFill rotWithShape="1">
+          <a:blip r:embed="rId2"/>
+          <a:srcRect r="-1082" b="48953"/>
+          <a:stretch/>
+        </p:blipFill>
+        <p:spPr>
+          <a:xfrm>
+            <a:off x="1242860" y="2014699"/>
+            <a:ext cx="6699869" cy="1696689"/>
+          </a:xfrm>
+          <a:prstGeom prst="rect">
+            <a:avLst/>
+          </a:prstGeom>
+        </p:spPr>
+      </p:pic>
+      <p:sp>
+        <p:nvSpPr>
+          <p:cNvPr id="8" name="正方形/長方形 7"/>
+          <p:cNvSpPr/>
+          <p:nvPr/>
+        </p:nvSpPr>
+        <p:spPr>
+          <a:xfrm>
+            <a:off x="2661528" y="3258021"/>
+            <a:ext cx="5209483" cy="372838"/>
+          </a:xfrm>
+          <a:prstGeom prst="rect">
+            <a:avLst/>
+          </a:prstGeom>
+          <a:noFill/>
+          <a:ln w="57150">
+            <a:solidFill>
+              <a:srgbClr val="FF0000"/>
+            </a:solidFill>
+          </a:ln>
+        </p:spPr>
+        <p:style>
+          <a:lnRef idx="1">
+            <a:schemeClr val="accent1"/>
+          </a:lnRef>
+          <a:fillRef idx="3">
+            <a:schemeClr val="accent1"/>
+          </a:fillRef>
+          <a:effectRef idx="2">
+            <a:schemeClr val="accent1"/>
+          </a:effectRef>
+          <a:fontRef idx="minor">
+            <a:schemeClr val="lt1"/>
+          </a:fontRef>
+        </p:style>
+        <p:txBody>
+          <a:bodyPr rtlCol="0" anchor="ctr"/>
+          <a:lstStyle/>
+          <a:p>
+            <a:pPr algn="ctr"/>
+            <a:endParaRPr kumimoji="1" lang="ja-JP" altLang="en-US" dirty="0">
+              <a:solidFill>
+                <a:srgbClr val="FF0000"/>
+              </a:solidFill>
+            </a:endParaRPr>
+          </a:p>
+        </p:txBody>
+      </p:sp>
+    </p:spTree>
+    <p:extLst>
+      <p:ext uri="{BB962C8B-B14F-4D97-AF65-F5344CB8AC3E}">
+        <p14:creationId xmlns:p14="http://schemas.microsoft.com/office/powerpoint/2010/main" val="1732598917"/>
+      </p:ext>
+    </p:extLst>
+  </p:cSld>
+  <p:clrMapOvr>
+    <a:masterClrMapping/>
+  </p:clrMapOvr>
+</p:sld>
+</file>
+
+<file path=ppt/slides/slide13.xml><?xml version="1.0" encoding="utf-8"?>
+<p:sld xmlns:a="http://schemas.openxmlformats.org/drawingml/2006/main" xmlns:r="http://schemas.openxmlformats.org/officeDocument/2006/relationships" xmlns:p="http://schemas.openxmlformats.org/presentationml/2006/main">
+  <p:cSld>
+    <p:spTree>
+      <p:nvGrpSpPr>
+        <p:cNvPr id="1" name=""/>
+        <p:cNvGrpSpPr/>
+        <p:nvPr/>
+      </p:nvGrpSpPr>
+      <p:grpSpPr>
+        <a:xfrm>
+          <a:off x="0" y="0"/>
+          <a:ext cx="0" cy="0"/>
+          <a:chOff x="0" y="0"/>
+          <a:chExt cx="0" cy="0"/>
+        </a:xfrm>
+      </p:grpSpPr>
+      <p:pic>
+        <p:nvPicPr>
+          <p:cNvPr id="5" name="図 4"/>
+          <p:cNvPicPr>
+            <a:picLocks noChangeAspect="1"/>
+          </p:cNvPicPr>
+          <p:nvPr/>
+        </p:nvPicPr>
+        <p:blipFill rotWithShape="1">
+          <a:blip r:embed="rId2"/>
+          <a:srcRect b="66717"/>
+          <a:stretch/>
+        </p:blipFill>
+        <p:spPr>
+          <a:xfrm>
+            <a:off x="1488702" y="1594222"/>
+            <a:ext cx="5986182" cy="1328272"/>
+          </a:xfrm>
+          <a:prstGeom prst="rect">
+            <a:avLst/>
+          </a:prstGeom>
+        </p:spPr>
+      </p:pic>
+      <p:sp>
+        <p:nvSpPr>
+          <p:cNvPr id="8" name="正方形/長方形 7"/>
+          <p:cNvSpPr/>
+          <p:nvPr/>
+        </p:nvSpPr>
+        <p:spPr>
+          <a:xfrm>
+            <a:off x="2671482" y="2474260"/>
+            <a:ext cx="4482353" cy="394447"/>
+          </a:xfrm>
+          <a:prstGeom prst="rect">
+            <a:avLst/>
+          </a:prstGeom>
+          <a:noFill/>
+          <a:ln w="57150">
+            <a:solidFill>
+              <a:srgbClr val="FF0000"/>
+            </a:solidFill>
+          </a:ln>
+        </p:spPr>
+        <p:style>
+          <a:lnRef idx="1">
+            <a:schemeClr val="accent1"/>
+          </a:lnRef>
+          <a:fillRef idx="3">
+            <a:schemeClr val="accent1"/>
+          </a:fillRef>
+          <a:effectRef idx="2">
+            <a:schemeClr val="accent1"/>
+          </a:effectRef>
+          <a:fontRef idx="minor">
+            <a:schemeClr val="lt1"/>
+          </a:fontRef>
+        </p:style>
+        <p:txBody>
+          <a:bodyPr rtlCol="0" anchor="ctr"/>
+          <a:lstStyle/>
+          <a:p>
+            <a:pPr algn="ctr"/>
+            <a:endParaRPr kumimoji="1" lang="ja-JP" altLang="en-US" dirty="0">
+              <a:solidFill>
+                <a:srgbClr val="FF0000"/>
+              </a:solidFill>
+            </a:endParaRPr>
+          </a:p>
+        </p:txBody>
+      </p:sp>
+    </p:spTree>
+    <p:extLst>
+      <p:ext uri="{BB962C8B-B14F-4D97-AF65-F5344CB8AC3E}">
+        <p14:creationId xmlns:p14="http://schemas.microsoft.com/office/powerpoint/2010/main" val="3871470308"/>
+      </p:ext>
+    </p:extLst>
+  </p:cSld>
+  <p:clrMapOvr>
+    <a:masterClrMapping/>
+  </p:clrMapOvr>
+</p:sld>
+</file>
+
+<file path=ppt/slides/slide14.xml><?xml version="1.0" encoding="utf-8"?>
+<p:sld xmlns:a="http://schemas.openxmlformats.org/drawingml/2006/main" xmlns:r="http://schemas.openxmlformats.org/officeDocument/2006/relationships" xmlns:p="http://schemas.openxmlformats.org/presentationml/2006/main">
+  <p:cSld>
+    <p:spTree>
+      <p:nvGrpSpPr>
+        <p:cNvPr id="1" name=""/>
+        <p:cNvGrpSpPr/>
+        <p:nvPr/>
+      </p:nvGrpSpPr>
+      <p:grpSpPr>
+        <a:xfrm>
+          <a:off x="0" y="0"/>
+          <a:ext cx="0" cy="0"/>
+          <a:chOff x="0" y="0"/>
+          <a:chExt cx="0" cy="0"/>
+        </a:xfrm>
+      </p:grpSpPr>
+      <p:pic>
+        <p:nvPicPr>
+          <p:cNvPr id="5" name="図 4"/>
+          <p:cNvPicPr>
+            <a:picLocks noChangeAspect="1"/>
+          </p:cNvPicPr>
+          <p:nvPr/>
+        </p:nvPicPr>
+        <p:blipFill>
+          <a:blip r:embed="rId2"/>
+          <a:stretch>
+            <a:fillRect/>
+          </a:stretch>
+        </p:blipFill>
+        <p:spPr>
+          <a:xfrm>
+            <a:off x="1488702" y="1594223"/>
+            <a:ext cx="5986182" cy="3990788"/>
+          </a:xfrm>
+          <a:prstGeom prst="rect">
+            <a:avLst/>
+          </a:prstGeom>
+        </p:spPr>
+      </p:pic>
+      <p:sp>
+        <p:nvSpPr>
+          <p:cNvPr id="8" name="正方形/長方形 7"/>
+          <p:cNvSpPr/>
+          <p:nvPr/>
+        </p:nvSpPr>
+        <p:spPr>
+          <a:xfrm>
+            <a:off x="2689411" y="2474260"/>
+            <a:ext cx="4482353" cy="394447"/>
+          </a:xfrm>
+          <a:prstGeom prst="rect">
+            <a:avLst/>
+          </a:prstGeom>
+          <a:noFill/>
+          <a:ln w="57150">
+            <a:solidFill>
+              <a:srgbClr val="FF0000"/>
+            </a:solidFill>
+          </a:ln>
+        </p:spPr>
+        <p:style>
+          <a:lnRef idx="1">
+            <a:schemeClr val="accent1"/>
+          </a:lnRef>
+          <a:fillRef idx="3">
+            <a:schemeClr val="accent1"/>
+          </a:fillRef>
+          <a:effectRef idx="2">
+            <a:schemeClr val="accent1"/>
+          </a:effectRef>
+          <a:fontRef idx="minor">
+            <a:schemeClr val="lt1"/>
+          </a:fontRef>
+        </p:style>
+        <p:txBody>
+          <a:bodyPr rtlCol="0" anchor="ctr"/>
+          <a:lstStyle/>
+          <a:p>
+            <a:pPr algn="ctr"/>
+            <a:endParaRPr kumimoji="1" lang="ja-JP" altLang="en-US" dirty="0">
+              <a:solidFill>
+                <a:srgbClr val="FF0000"/>
+              </a:solidFill>
+            </a:endParaRPr>
+          </a:p>
+        </p:txBody>
+      </p:sp>
+      <p:sp>
+        <p:nvSpPr>
+          <p:cNvPr id="4" name="正方形/長方形 3"/>
+          <p:cNvSpPr/>
+          <p:nvPr/>
+        </p:nvSpPr>
+        <p:spPr>
+          <a:xfrm>
+            <a:off x="3012142" y="4195482"/>
+            <a:ext cx="3514164" cy="1272988"/>
+          </a:xfrm>
+          <a:prstGeom prst="rect">
+            <a:avLst/>
+          </a:prstGeom>
+          <a:noFill/>
+          <a:ln w="57150">
+            <a:solidFill>
+              <a:srgbClr val="FF0000"/>
+            </a:solidFill>
+          </a:ln>
+        </p:spPr>
+        <p:style>
+          <a:lnRef idx="1">
+            <a:schemeClr val="accent1"/>
+          </a:lnRef>
+          <a:fillRef idx="3">
+            <a:schemeClr val="accent1"/>
+          </a:fillRef>
+          <a:effectRef idx="2">
+            <a:schemeClr val="accent1"/>
+          </a:effectRef>
+          <a:fontRef idx="minor">
+            <a:schemeClr val="lt1"/>
+          </a:fontRef>
+        </p:style>
+        <p:txBody>
+          <a:bodyPr rtlCol="0" anchor="ctr"/>
+          <a:lstStyle/>
+          <a:p>
+            <a:pPr algn="ctr"/>
+            <a:endParaRPr kumimoji="1" lang="ja-JP" altLang="en-US" dirty="0">
+              <a:solidFill>
+                <a:srgbClr val="FF0000"/>
+              </a:solidFill>
+            </a:endParaRPr>
+          </a:p>
+        </p:txBody>
+      </p:sp>
+    </p:spTree>
+    <p:extLst>
+      <p:ext uri="{BB962C8B-B14F-4D97-AF65-F5344CB8AC3E}">
+        <p14:creationId xmlns:p14="http://schemas.microsoft.com/office/powerpoint/2010/main" val="2540148913"/>
+      </p:ext>
+    </p:extLst>
+  </p:cSld>
+  <p:clrMapOvr>
+    <a:masterClrMapping/>
+  </p:clrMapOvr>
+</p:sld>
+</file>
+
+<file path=ppt/slides/slide15.xml><?xml version="1.0" encoding="utf-8"?>
+<p:sld xmlns:a="http://schemas.openxmlformats.org/drawingml/2006/main" xmlns:r="http://schemas.openxmlformats.org/officeDocument/2006/relationships" xmlns:p="http://schemas.openxmlformats.org/presentationml/2006/main">
+  <p:cSld>
+    <p:spTree>
+      <p:nvGrpSpPr>
+        <p:cNvPr id="1" name=""/>
+        <p:cNvGrpSpPr/>
+        <p:nvPr/>
+      </p:nvGrpSpPr>
+      <p:grpSpPr>
+        <a:xfrm>
+          <a:off x="0" y="0"/>
+          <a:ext cx="0" cy="0"/>
+          <a:chOff x="0" y="0"/>
+          <a:chExt cx="0" cy="0"/>
+        </a:xfrm>
+      </p:grpSpPr>
+      <p:pic>
+        <p:nvPicPr>
+          <p:cNvPr id="3" name="図 2"/>
+          <p:cNvPicPr>
+            <a:picLocks noChangeAspect="1"/>
+          </p:cNvPicPr>
+          <p:nvPr/>
+        </p:nvPicPr>
+        <p:blipFill>
+          <a:blip r:embed="rId2"/>
+          <a:stretch>
+            <a:fillRect/>
+          </a:stretch>
+        </p:blipFill>
+        <p:spPr>
+          <a:xfrm>
+            <a:off x="1558099" y="2653421"/>
+            <a:ext cx="5930933" cy="1865911"/>
+          </a:xfrm>
+          <a:prstGeom prst="rect">
+            <a:avLst/>
+          </a:prstGeom>
+        </p:spPr>
+      </p:pic>
+      <p:sp>
+        <p:nvSpPr>
+          <p:cNvPr id="8" name="正方形/長方形 7"/>
+          <p:cNvSpPr/>
+          <p:nvPr/>
+        </p:nvSpPr>
+        <p:spPr>
+          <a:xfrm>
+            <a:off x="3173506" y="4034117"/>
+            <a:ext cx="4177553" cy="394447"/>
+          </a:xfrm>
+          <a:prstGeom prst="rect">
+            <a:avLst/>
+          </a:prstGeom>
+          <a:noFill/>
+          <a:ln w="57150">
+            <a:solidFill>
+              <a:srgbClr val="FF0000"/>
+            </a:solidFill>
+          </a:ln>
+        </p:spPr>
+        <p:style>
+          <a:lnRef idx="1">
+            <a:schemeClr val="accent1"/>
+          </a:lnRef>
+          <a:fillRef idx="3">
+            <a:schemeClr val="accent1"/>
+          </a:fillRef>
+          <a:effectRef idx="2">
+            <a:schemeClr val="accent1"/>
+          </a:effectRef>
+          <a:fontRef idx="minor">
+            <a:schemeClr val="lt1"/>
+          </a:fontRef>
+        </p:style>
+        <p:txBody>
+          <a:bodyPr rtlCol="0" anchor="ctr"/>
+          <a:lstStyle/>
+          <a:p>
+            <a:pPr algn="ctr"/>
+            <a:endParaRPr kumimoji="1" lang="ja-JP" altLang="en-US" dirty="0">
+              <a:solidFill>
+                <a:srgbClr val="FF0000"/>
+              </a:solidFill>
+            </a:endParaRPr>
+          </a:p>
+        </p:txBody>
+      </p:sp>
+    </p:spTree>
+    <p:extLst>
+      <p:ext uri="{BB962C8B-B14F-4D97-AF65-F5344CB8AC3E}">
+        <p14:creationId xmlns:p14="http://schemas.microsoft.com/office/powerpoint/2010/main" val="1504583158"/>
+      </p:ext>
+    </p:extLst>
+  </p:cSld>
+  <p:clrMapOvr>
+    <a:masterClrMapping/>
+  </p:clrMapOvr>
+</p:sld>
+</file>
+
+<file path=ppt/slides/slide16.xml><?xml version="1.0" encoding="utf-8"?>
+<p:sld xmlns:a="http://schemas.openxmlformats.org/drawingml/2006/main" xmlns:r="http://schemas.openxmlformats.org/officeDocument/2006/relationships" xmlns:p="http://schemas.openxmlformats.org/presentationml/2006/main">
+  <p:cSld>
+    <p:spTree>
+      <p:nvGrpSpPr>
+        <p:cNvPr id="1" name=""/>
+        <p:cNvGrpSpPr/>
+        <p:nvPr/>
+      </p:nvGrpSpPr>
+      <p:grpSpPr>
+        <a:xfrm>
+          <a:off x="0" y="0"/>
+          <a:ext cx="0" cy="0"/>
+          <a:chOff x="0" y="0"/>
+          <a:chExt cx="0" cy="0"/>
+        </a:xfrm>
+      </p:grpSpPr>
+      <p:pic>
+        <p:nvPicPr>
+          <p:cNvPr id="2" name="図 1"/>
+          <p:cNvPicPr>
+            <a:picLocks noChangeAspect="1"/>
+          </p:cNvPicPr>
+          <p:nvPr/>
+        </p:nvPicPr>
+        <p:blipFill rotWithShape="1">
+          <a:blip r:embed="rId2"/>
+          <a:srcRect l="1" r="-1845" b="65537"/>
+          <a:stretch/>
+        </p:blipFill>
+        <p:spPr>
+          <a:xfrm>
+            <a:off x="1360499" y="2725270"/>
+            <a:ext cx="6241571" cy="1514307"/>
+          </a:xfrm>
+          <a:prstGeom prst="rect">
+            <a:avLst/>
+          </a:prstGeom>
+        </p:spPr>
+      </p:pic>
+      <p:sp>
+        <p:nvSpPr>
+          <p:cNvPr id="8" name="正方形/長方形 7"/>
+          <p:cNvSpPr/>
+          <p:nvPr/>
+        </p:nvSpPr>
+        <p:spPr>
+          <a:xfrm>
+            <a:off x="2653552" y="3693458"/>
+            <a:ext cx="4835479" cy="430306"/>
+          </a:xfrm>
+          <a:prstGeom prst="rect">
+            <a:avLst/>
+          </a:prstGeom>
+          <a:noFill/>
+          <a:ln w="57150">
+            <a:solidFill>
+              <a:srgbClr val="FF0000"/>
+            </a:solidFill>
+          </a:ln>
+        </p:spPr>
+        <p:style>
+          <a:lnRef idx="1">
+            <a:schemeClr val="accent1"/>
+          </a:lnRef>
+          <a:fillRef idx="3">
+            <a:schemeClr val="accent1"/>
+          </a:fillRef>
+          <a:effectRef idx="2">
+            <a:schemeClr val="accent1"/>
+          </a:effectRef>
+          <a:fontRef idx="minor">
+            <a:schemeClr val="lt1"/>
+          </a:fontRef>
+        </p:style>
+        <p:txBody>
+          <a:bodyPr rtlCol="0" anchor="ctr"/>
+          <a:lstStyle/>
+          <a:p>
+            <a:pPr algn="ctr"/>
+            <a:endParaRPr kumimoji="1" lang="ja-JP" altLang="en-US" dirty="0">
+              <a:solidFill>
+                <a:srgbClr val="FF0000"/>
+              </a:solidFill>
+            </a:endParaRPr>
+          </a:p>
+        </p:txBody>
+      </p:sp>
+    </p:spTree>
+    <p:extLst>
+      <p:ext uri="{BB962C8B-B14F-4D97-AF65-F5344CB8AC3E}">
+        <p14:creationId xmlns:p14="http://schemas.microsoft.com/office/powerpoint/2010/main" val="3067011605"/>
+      </p:ext>
+    </p:extLst>
+  </p:cSld>
+  <p:clrMapOvr>
+    <a:masterClrMapping/>
+  </p:clrMapOvr>
+</p:sld>
+</file>
+
+<file path=ppt/slides/slide17.xml><?xml version="1.0" encoding="utf-8"?>
+<p:sld xmlns:a="http://schemas.openxmlformats.org/drawingml/2006/main" xmlns:r="http://schemas.openxmlformats.org/officeDocument/2006/relationships" xmlns:p="http://schemas.openxmlformats.org/presentationml/2006/main">
+  <p:cSld>
+    <p:spTree>
+      <p:nvGrpSpPr>
+        <p:cNvPr id="1" name=""/>
+        <p:cNvGrpSpPr/>
+        <p:nvPr/>
+      </p:nvGrpSpPr>
+      <p:grpSpPr>
+        <a:xfrm>
+          <a:off x="0" y="0"/>
+          <a:ext cx="0" cy="0"/>
+          <a:chOff x="0" y="0"/>
+          <a:chExt cx="0" cy="0"/>
+        </a:xfrm>
+      </p:grpSpPr>
+      <p:pic>
+        <p:nvPicPr>
+          <p:cNvPr id="2" name="図 1"/>
+          <p:cNvPicPr>
+            <a:picLocks noChangeAspect="1"/>
+          </p:cNvPicPr>
+          <p:nvPr/>
+        </p:nvPicPr>
+        <p:blipFill rotWithShape="1">
+          <a:blip r:embed="rId2"/>
+          <a:srcRect b="58604"/>
+          <a:stretch/>
+        </p:blipFill>
+        <p:spPr>
+          <a:xfrm>
+            <a:off x="1136407" y="2037089"/>
+            <a:ext cx="7406958" cy="2559704"/>
+          </a:xfrm>
+          <a:prstGeom prst="rect">
+            <a:avLst/>
+          </a:prstGeom>
+        </p:spPr>
+      </p:pic>
+      <p:sp>
+        <p:nvSpPr>
+          <p:cNvPr id="3" name="正方形/長方形 2"/>
+          <p:cNvSpPr/>
+          <p:nvPr/>
+        </p:nvSpPr>
+        <p:spPr>
+          <a:xfrm>
+            <a:off x="1685362" y="2698376"/>
+            <a:ext cx="2259109" cy="233082"/>
+          </a:xfrm>
+          <a:prstGeom prst="rect">
+            <a:avLst/>
+          </a:prstGeom>
+          <a:noFill/>
+          <a:ln w="57150">
+            <a:solidFill>
+              <a:srgbClr val="FF0000"/>
+            </a:solidFill>
+          </a:ln>
+        </p:spPr>
+        <p:style>
+          <a:lnRef idx="1">
+            <a:schemeClr val="accent1"/>
+          </a:lnRef>
+          <a:fillRef idx="3">
+            <a:schemeClr val="accent1"/>
+          </a:fillRef>
+          <a:effectRef idx="2">
+            <a:schemeClr val="accent1"/>
+          </a:effectRef>
+          <a:fontRef idx="minor">
+            <a:schemeClr val="lt1"/>
+          </a:fontRef>
+        </p:style>
+        <p:txBody>
+          <a:bodyPr rtlCol="0" anchor="ctr"/>
+          <a:lstStyle/>
+          <a:p>
+            <a:pPr algn="ctr"/>
+            <a:endParaRPr kumimoji="1" lang="ja-JP" altLang="en-US" dirty="0">
+              <a:solidFill>
+                <a:srgbClr val="FF0000"/>
+              </a:solidFill>
+            </a:endParaRPr>
+          </a:p>
+        </p:txBody>
+      </p:sp>
+    </p:spTree>
+    <p:extLst>
+      <p:ext uri="{BB962C8B-B14F-4D97-AF65-F5344CB8AC3E}">
+        <p14:creationId xmlns:p14="http://schemas.microsoft.com/office/powerpoint/2010/main" val="2476374957"/>
+      </p:ext>
+    </p:extLst>
+  </p:cSld>
+  <p:clrMapOvr>
+    <a:masterClrMapping/>
+  </p:clrMapOvr>
+</p:sld>
+</file>
+
+<file path=ppt/slides/slide18.xml><?xml version="1.0" encoding="utf-8"?>
+<p:sld xmlns:a="http://schemas.openxmlformats.org/drawingml/2006/main" xmlns:r="http://schemas.openxmlformats.org/officeDocument/2006/relationships" xmlns:p="http://schemas.openxmlformats.org/presentationml/2006/main">
+  <p:cSld>
+    <p:spTree>
+      <p:nvGrpSpPr>
+        <p:cNvPr id="1" name=""/>
+        <p:cNvGrpSpPr/>
+        <p:nvPr/>
+      </p:nvGrpSpPr>
+      <p:grpSpPr>
+        <a:xfrm>
+          <a:off x="0" y="0"/>
+          <a:ext cx="0" cy="0"/>
+          <a:chOff x="0" y="0"/>
+          <a:chExt cx="0" cy="0"/>
+        </a:xfrm>
+      </p:grpSpPr>
+      <p:pic>
+        <p:nvPicPr>
+          <p:cNvPr id="3" name="図 2"/>
+          <p:cNvPicPr>
+            <a:picLocks noChangeAspect="1"/>
+          </p:cNvPicPr>
+          <p:nvPr/>
+        </p:nvPicPr>
+        <p:blipFill>
+          <a:blip r:embed="rId2"/>
+          <a:stretch>
+            <a:fillRect/>
+          </a:stretch>
+        </p:blipFill>
+        <p:spPr>
+          <a:xfrm>
+            <a:off x="407700" y="2333625"/>
+            <a:ext cx="8356348" cy="2632822"/>
+          </a:xfrm>
+          <a:prstGeom prst="rect">
+            <a:avLst/>
+          </a:prstGeom>
+        </p:spPr>
+      </p:pic>
+      <p:sp>
+        <p:nvSpPr>
+          <p:cNvPr id="4" name="正方形/長方形 3"/>
+          <p:cNvSpPr/>
+          <p:nvPr/>
+        </p:nvSpPr>
+        <p:spPr>
+          <a:xfrm>
+            <a:off x="5020235" y="3845859"/>
+            <a:ext cx="3424518" cy="233082"/>
+          </a:xfrm>
+          <a:prstGeom prst="rect">
+            <a:avLst/>
+          </a:prstGeom>
+          <a:noFill/>
+          <a:ln w="57150">
+            <a:solidFill>
+              <a:srgbClr val="FF0000"/>
+            </a:solidFill>
+          </a:ln>
+        </p:spPr>
+        <p:style>
+          <a:lnRef idx="1">
+            <a:schemeClr val="accent1"/>
+          </a:lnRef>
+          <a:fillRef idx="3">
+            <a:schemeClr val="accent1"/>
+          </a:fillRef>
+          <a:effectRef idx="2">
+            <a:schemeClr val="accent1"/>
+          </a:effectRef>
+          <a:fontRef idx="minor">
+            <a:schemeClr val="lt1"/>
+          </a:fontRef>
+        </p:style>
+        <p:txBody>
+          <a:bodyPr rtlCol="0" anchor="ctr"/>
+          <a:lstStyle/>
+          <a:p>
+            <a:pPr algn="ctr"/>
+            <a:endParaRPr kumimoji="1" lang="ja-JP" altLang="en-US" dirty="0">
+              <a:solidFill>
+                <a:srgbClr val="FF0000"/>
+              </a:solidFill>
+            </a:endParaRPr>
+          </a:p>
+        </p:txBody>
+      </p:sp>
+    </p:spTree>
+    <p:extLst>
+      <p:ext uri="{BB962C8B-B14F-4D97-AF65-F5344CB8AC3E}">
+        <p14:creationId xmlns:p14="http://schemas.microsoft.com/office/powerpoint/2010/main" val="538825934"/>
+      </p:ext>
+    </p:extLst>
+  </p:cSld>
+  <p:clrMapOvr>
+    <a:masterClrMapping/>
+  </p:clrMapOvr>
+</p:sld>
+</file>
+
+<file path=ppt/slides/slide19.xml><?xml version="1.0" encoding="utf-8"?>
+<p:sld xmlns:a="http://schemas.openxmlformats.org/drawingml/2006/main" xmlns:r="http://schemas.openxmlformats.org/officeDocument/2006/relationships" xmlns:p="http://schemas.openxmlformats.org/presentationml/2006/main">
+  <p:cSld>
+    <p:spTree>
+      <p:nvGrpSpPr>
+        <p:cNvPr id="1" name=""/>
+        <p:cNvGrpSpPr/>
+        <p:nvPr/>
+      </p:nvGrpSpPr>
+      <p:grpSpPr>
+        <a:xfrm>
+          <a:off x="0" y="0"/>
+          <a:ext cx="0" cy="0"/>
+          <a:chOff x="0" y="0"/>
+          <a:chExt cx="0" cy="0"/>
+        </a:xfrm>
+      </p:grpSpPr>
+      <p:pic>
+        <p:nvPicPr>
+          <p:cNvPr id="4" name="図 3"/>
+          <p:cNvPicPr>
+            <a:picLocks noChangeAspect="1"/>
+          </p:cNvPicPr>
+          <p:nvPr/>
+        </p:nvPicPr>
+        <p:blipFill>
+          <a:blip r:embed="rId2"/>
+          <a:stretch>
+            <a:fillRect/>
+          </a:stretch>
+        </p:blipFill>
+        <p:spPr>
+          <a:xfrm>
+            <a:off x="734168" y="2019299"/>
+            <a:ext cx="7558745" cy="3485029"/>
+          </a:xfrm>
+          <a:prstGeom prst="rect">
+            <a:avLst/>
+          </a:prstGeom>
+        </p:spPr>
+      </p:pic>
+    </p:spTree>
+    <p:extLst>
+      <p:ext uri="{BB962C8B-B14F-4D97-AF65-F5344CB8AC3E}">
+        <p14:creationId xmlns:p14="http://schemas.microsoft.com/office/powerpoint/2010/main" val="310312164"/>
+      </p:ext>
+    </p:extLst>
+  </p:cSld>
+  <p:clrMapOvr>
+    <a:masterClrMapping/>
+  </p:clrMapOvr>
+</p:sld>
+</file>
+
 <file path=ppt/slides/slide2.xml><?xml version="1.0" encoding="utf-8"?>
 <p:sld xmlns:a="http://schemas.openxmlformats.org/drawingml/2006/main" xmlns:r="http://schemas.openxmlformats.org/officeDocument/2006/relationships" xmlns:p="http://schemas.openxmlformats.org/presentationml/2006/main">
   <p:cSld>
@@ -6494,6 +7667,629 @@
       </p:par>
     </p:tnLst>
   </p:timing>
+</p:sld>
+</file>
+
+<file path=ppt/slides/slide20.xml><?xml version="1.0" encoding="utf-8"?>
+<p:sld xmlns:a="http://schemas.openxmlformats.org/drawingml/2006/main" xmlns:r="http://schemas.openxmlformats.org/officeDocument/2006/relationships" xmlns:p="http://schemas.openxmlformats.org/presentationml/2006/main">
+  <p:cSld>
+    <p:spTree>
+      <p:nvGrpSpPr>
+        <p:cNvPr id="1" name=""/>
+        <p:cNvGrpSpPr/>
+        <p:nvPr/>
+      </p:nvGrpSpPr>
+      <p:grpSpPr>
+        <a:xfrm>
+          <a:off x="0" y="0"/>
+          <a:ext cx="0" cy="0"/>
+          <a:chOff x="0" y="0"/>
+          <a:chExt cx="0" cy="0"/>
+        </a:xfrm>
+      </p:grpSpPr>
+      <p:pic>
+        <p:nvPicPr>
+          <p:cNvPr id="3" name="図 2"/>
+          <p:cNvPicPr>
+            <a:picLocks noChangeAspect="1"/>
+          </p:cNvPicPr>
+          <p:nvPr/>
+        </p:nvPicPr>
+        <p:blipFill>
+          <a:blip r:embed="rId2"/>
+          <a:stretch>
+            <a:fillRect/>
+          </a:stretch>
+        </p:blipFill>
+        <p:spPr>
+          <a:xfrm>
+            <a:off x="728862" y="1962149"/>
+            <a:ext cx="7694320" cy="3685615"/>
+          </a:xfrm>
+          <a:prstGeom prst="rect">
+            <a:avLst/>
+          </a:prstGeom>
+        </p:spPr>
+      </p:pic>
+    </p:spTree>
+    <p:extLst>
+      <p:ext uri="{BB962C8B-B14F-4D97-AF65-F5344CB8AC3E}">
+        <p14:creationId xmlns:p14="http://schemas.microsoft.com/office/powerpoint/2010/main" val="145253215"/>
+      </p:ext>
+    </p:extLst>
+  </p:cSld>
+  <p:clrMapOvr>
+    <a:masterClrMapping/>
+  </p:clrMapOvr>
+</p:sld>
+</file>
+
+<file path=ppt/slides/slide21.xml><?xml version="1.0" encoding="utf-8"?>
+<p:sld xmlns:a="http://schemas.openxmlformats.org/drawingml/2006/main" xmlns:r="http://schemas.openxmlformats.org/officeDocument/2006/relationships" xmlns:p="http://schemas.openxmlformats.org/presentationml/2006/main">
+  <p:cSld>
+    <p:spTree>
+      <p:nvGrpSpPr>
+        <p:cNvPr id="1" name=""/>
+        <p:cNvGrpSpPr/>
+        <p:nvPr/>
+      </p:nvGrpSpPr>
+      <p:grpSpPr>
+        <a:xfrm>
+          <a:off x="0" y="0"/>
+          <a:ext cx="0" cy="0"/>
+          <a:chOff x="0" y="0"/>
+          <a:chExt cx="0" cy="0"/>
+        </a:xfrm>
+      </p:grpSpPr>
+      <p:pic>
+        <p:nvPicPr>
+          <p:cNvPr id="2" name="図 1"/>
+          <p:cNvPicPr>
+            <a:picLocks noChangeAspect="1"/>
+          </p:cNvPicPr>
+          <p:nvPr/>
+        </p:nvPicPr>
+        <p:blipFill>
+          <a:blip r:embed="rId2"/>
+          <a:stretch>
+            <a:fillRect/>
+          </a:stretch>
+        </p:blipFill>
+        <p:spPr>
+          <a:xfrm>
+            <a:off x="664854" y="1857374"/>
+            <a:ext cx="7816878" cy="4005543"/>
+          </a:xfrm>
+          <a:prstGeom prst="rect">
+            <a:avLst/>
+          </a:prstGeom>
+        </p:spPr>
+      </p:pic>
+    </p:spTree>
+    <p:extLst>
+      <p:ext uri="{BB962C8B-B14F-4D97-AF65-F5344CB8AC3E}">
+        <p14:creationId xmlns:p14="http://schemas.microsoft.com/office/powerpoint/2010/main" val="2668270866"/>
+      </p:ext>
+    </p:extLst>
+  </p:cSld>
+  <p:clrMapOvr>
+    <a:masterClrMapping/>
+  </p:clrMapOvr>
+</p:sld>
+</file>
+
+<file path=ppt/slides/slide22.xml><?xml version="1.0" encoding="utf-8"?>
+<p:sld xmlns:a="http://schemas.openxmlformats.org/drawingml/2006/main" xmlns:r="http://schemas.openxmlformats.org/officeDocument/2006/relationships" xmlns:p="http://schemas.openxmlformats.org/presentationml/2006/main">
+  <p:cSld>
+    <p:spTree>
+      <p:nvGrpSpPr>
+        <p:cNvPr id="1" name=""/>
+        <p:cNvGrpSpPr/>
+        <p:nvPr/>
+      </p:nvGrpSpPr>
+      <p:grpSpPr>
+        <a:xfrm>
+          <a:off x="0" y="0"/>
+          <a:ext cx="0" cy="0"/>
+          <a:chOff x="0" y="0"/>
+          <a:chExt cx="0" cy="0"/>
+        </a:xfrm>
+      </p:grpSpPr>
+      <p:pic>
+        <p:nvPicPr>
+          <p:cNvPr id="6" name="図 5"/>
+          <p:cNvPicPr>
+            <a:picLocks noChangeAspect="1"/>
+          </p:cNvPicPr>
+          <p:nvPr/>
+        </p:nvPicPr>
+        <p:blipFill rotWithShape="1">
+          <a:blip r:embed="rId2"/>
+          <a:srcRect b="34096"/>
+          <a:stretch/>
+        </p:blipFill>
+        <p:spPr>
+          <a:xfrm>
+            <a:off x="724179" y="1595566"/>
+            <a:ext cx="7864009" cy="3657752"/>
+          </a:xfrm>
+          <a:prstGeom prst="rect">
+            <a:avLst/>
+          </a:prstGeom>
+        </p:spPr>
+      </p:pic>
+      <p:sp>
+        <p:nvSpPr>
+          <p:cNvPr id="4" name="正方形/長方形 3"/>
+          <p:cNvSpPr/>
+          <p:nvPr/>
+        </p:nvSpPr>
+        <p:spPr>
+          <a:xfrm>
+            <a:off x="950260" y="2850776"/>
+            <a:ext cx="1272989" cy="358589"/>
+          </a:xfrm>
+          <a:prstGeom prst="rect">
+            <a:avLst/>
+          </a:prstGeom>
+          <a:noFill/>
+          <a:ln w="57150">
+            <a:solidFill>
+              <a:srgbClr val="FF0000"/>
+            </a:solidFill>
+          </a:ln>
+        </p:spPr>
+        <p:style>
+          <a:lnRef idx="1">
+            <a:schemeClr val="accent1"/>
+          </a:lnRef>
+          <a:fillRef idx="3">
+            <a:schemeClr val="accent1"/>
+          </a:fillRef>
+          <a:effectRef idx="2">
+            <a:schemeClr val="accent1"/>
+          </a:effectRef>
+          <a:fontRef idx="minor">
+            <a:schemeClr val="lt1"/>
+          </a:fontRef>
+        </p:style>
+        <p:txBody>
+          <a:bodyPr rtlCol="0" anchor="ctr"/>
+          <a:lstStyle/>
+          <a:p>
+            <a:pPr algn="ctr"/>
+            <a:endParaRPr kumimoji="1" lang="ja-JP" altLang="en-US" dirty="0">
+              <a:solidFill>
+                <a:srgbClr val="FF0000"/>
+              </a:solidFill>
+            </a:endParaRPr>
+          </a:p>
+        </p:txBody>
+      </p:sp>
+    </p:spTree>
+    <p:extLst>
+      <p:ext uri="{BB962C8B-B14F-4D97-AF65-F5344CB8AC3E}">
+        <p14:creationId xmlns:p14="http://schemas.microsoft.com/office/powerpoint/2010/main" val="2056463425"/>
+      </p:ext>
+    </p:extLst>
+  </p:cSld>
+  <p:clrMapOvr>
+    <a:masterClrMapping/>
+  </p:clrMapOvr>
+</p:sld>
+</file>
+
+<file path=ppt/slides/slide23.xml><?xml version="1.0" encoding="utf-8"?>
+<p:sld xmlns:a="http://schemas.openxmlformats.org/drawingml/2006/main" xmlns:r="http://schemas.openxmlformats.org/officeDocument/2006/relationships" xmlns:p="http://schemas.openxmlformats.org/presentationml/2006/main">
+  <p:cSld>
+    <p:spTree>
+      <p:nvGrpSpPr>
+        <p:cNvPr id="1" name=""/>
+        <p:cNvGrpSpPr/>
+        <p:nvPr/>
+      </p:nvGrpSpPr>
+      <p:grpSpPr>
+        <a:xfrm>
+          <a:off x="0" y="0"/>
+          <a:ext cx="0" cy="0"/>
+          <a:chOff x="0" y="0"/>
+          <a:chExt cx="0" cy="0"/>
+        </a:xfrm>
+      </p:grpSpPr>
+      <p:pic>
+        <p:nvPicPr>
+          <p:cNvPr id="2" name="図 1"/>
+          <p:cNvPicPr>
+            <a:picLocks noChangeAspect="1"/>
+          </p:cNvPicPr>
+          <p:nvPr/>
+        </p:nvPicPr>
+        <p:blipFill>
+          <a:blip r:embed="rId2"/>
+          <a:stretch>
+            <a:fillRect/>
+          </a:stretch>
+        </p:blipFill>
+        <p:spPr>
+          <a:xfrm>
+            <a:off x="532559" y="2115671"/>
+            <a:ext cx="7997442" cy="2921934"/>
+          </a:xfrm>
+          <a:prstGeom prst="rect">
+            <a:avLst/>
+          </a:prstGeom>
+        </p:spPr>
+      </p:pic>
+      <p:sp>
+        <p:nvSpPr>
+          <p:cNvPr id="4" name="正方形/長方形 3"/>
+          <p:cNvSpPr/>
+          <p:nvPr/>
+        </p:nvSpPr>
+        <p:spPr>
+          <a:xfrm>
+            <a:off x="4867837" y="3836898"/>
+            <a:ext cx="3567954" cy="233082"/>
+          </a:xfrm>
+          <a:prstGeom prst="rect">
+            <a:avLst/>
+          </a:prstGeom>
+          <a:noFill/>
+          <a:ln w="57150">
+            <a:solidFill>
+              <a:srgbClr val="FF0000"/>
+            </a:solidFill>
+          </a:ln>
+        </p:spPr>
+        <p:style>
+          <a:lnRef idx="1">
+            <a:schemeClr val="accent1"/>
+          </a:lnRef>
+          <a:fillRef idx="3">
+            <a:schemeClr val="accent1"/>
+          </a:fillRef>
+          <a:effectRef idx="2">
+            <a:schemeClr val="accent1"/>
+          </a:effectRef>
+          <a:fontRef idx="minor">
+            <a:schemeClr val="lt1"/>
+          </a:fontRef>
+        </p:style>
+        <p:txBody>
+          <a:bodyPr rtlCol="0" anchor="ctr"/>
+          <a:lstStyle/>
+          <a:p>
+            <a:pPr algn="ctr"/>
+            <a:endParaRPr kumimoji="1" lang="ja-JP" altLang="en-US" dirty="0">
+              <a:solidFill>
+                <a:srgbClr val="FF0000"/>
+              </a:solidFill>
+            </a:endParaRPr>
+          </a:p>
+        </p:txBody>
+      </p:sp>
+    </p:spTree>
+    <p:extLst>
+      <p:ext uri="{BB962C8B-B14F-4D97-AF65-F5344CB8AC3E}">
+        <p14:creationId xmlns:p14="http://schemas.microsoft.com/office/powerpoint/2010/main" val="1626585002"/>
+      </p:ext>
+    </p:extLst>
+  </p:cSld>
+  <p:clrMapOvr>
+    <a:masterClrMapping/>
+  </p:clrMapOvr>
+</p:sld>
+</file>
+
+<file path=ppt/slides/slide24.xml><?xml version="1.0" encoding="utf-8"?>
+<p:sld xmlns:a="http://schemas.openxmlformats.org/drawingml/2006/main" xmlns:r="http://schemas.openxmlformats.org/officeDocument/2006/relationships" xmlns:p="http://schemas.openxmlformats.org/presentationml/2006/main">
+  <p:cSld>
+    <p:spTree>
+      <p:nvGrpSpPr>
+        <p:cNvPr id="1" name=""/>
+        <p:cNvGrpSpPr/>
+        <p:nvPr/>
+      </p:nvGrpSpPr>
+      <p:grpSpPr>
+        <a:xfrm>
+          <a:off x="0" y="0"/>
+          <a:ext cx="0" cy="0"/>
+          <a:chOff x="0" y="0"/>
+          <a:chExt cx="0" cy="0"/>
+        </a:xfrm>
+      </p:grpSpPr>
+      <p:pic>
+        <p:nvPicPr>
+          <p:cNvPr id="3" name="図 2"/>
+          <p:cNvPicPr>
+            <a:picLocks noChangeAspect="1"/>
+          </p:cNvPicPr>
+          <p:nvPr/>
+        </p:nvPicPr>
+        <p:blipFill>
+          <a:blip r:embed="rId2"/>
+          <a:stretch>
+            <a:fillRect/>
+          </a:stretch>
+        </p:blipFill>
+        <p:spPr>
+          <a:xfrm>
+            <a:off x="990040" y="1249393"/>
+            <a:ext cx="7347136" cy="4713257"/>
+          </a:xfrm>
+          <a:prstGeom prst="rect">
+            <a:avLst/>
+          </a:prstGeom>
+        </p:spPr>
+      </p:pic>
+    </p:spTree>
+    <p:extLst>
+      <p:ext uri="{BB962C8B-B14F-4D97-AF65-F5344CB8AC3E}">
+        <p14:creationId xmlns:p14="http://schemas.microsoft.com/office/powerpoint/2010/main" val="1996933272"/>
+      </p:ext>
+    </p:extLst>
+  </p:cSld>
+  <p:clrMapOvr>
+    <a:masterClrMapping/>
+  </p:clrMapOvr>
+</p:sld>
+</file>
+
+<file path=ppt/slides/slide25.xml><?xml version="1.0" encoding="utf-8"?>
+<p:sld xmlns:a="http://schemas.openxmlformats.org/drawingml/2006/main" xmlns:r="http://schemas.openxmlformats.org/officeDocument/2006/relationships" xmlns:p="http://schemas.openxmlformats.org/presentationml/2006/main">
+  <p:cSld>
+    <p:spTree>
+      <p:nvGrpSpPr>
+        <p:cNvPr id="1" name=""/>
+        <p:cNvGrpSpPr/>
+        <p:nvPr/>
+      </p:nvGrpSpPr>
+      <p:grpSpPr>
+        <a:xfrm>
+          <a:off x="0" y="0"/>
+          <a:ext cx="0" cy="0"/>
+          <a:chOff x="0" y="0"/>
+          <a:chExt cx="0" cy="0"/>
+        </a:xfrm>
+      </p:grpSpPr>
+      <p:pic>
+        <p:nvPicPr>
+          <p:cNvPr id="6" name="図 5"/>
+          <p:cNvPicPr>
+            <a:picLocks noChangeAspect="1"/>
+          </p:cNvPicPr>
+          <p:nvPr/>
+        </p:nvPicPr>
+        <p:blipFill>
+          <a:blip r:embed="rId2"/>
+          <a:stretch>
+            <a:fillRect/>
+          </a:stretch>
+        </p:blipFill>
+        <p:spPr>
+          <a:xfrm>
+            <a:off x="960624" y="1461851"/>
+            <a:ext cx="7645494" cy="4409437"/>
+          </a:xfrm>
+          <a:prstGeom prst="rect">
+            <a:avLst/>
+          </a:prstGeom>
+        </p:spPr>
+      </p:pic>
+      <p:sp>
+        <p:nvSpPr>
+          <p:cNvPr id="3" name="正方形/長方形 2"/>
+          <p:cNvSpPr/>
+          <p:nvPr/>
+        </p:nvSpPr>
+        <p:spPr>
+          <a:xfrm>
+            <a:off x="1658474" y="3272123"/>
+            <a:ext cx="1927408" cy="233082"/>
+          </a:xfrm>
+          <a:prstGeom prst="rect">
+            <a:avLst/>
+          </a:prstGeom>
+          <a:noFill/>
+          <a:ln w="57150">
+            <a:solidFill>
+              <a:srgbClr val="FF0000"/>
+            </a:solidFill>
+          </a:ln>
+        </p:spPr>
+        <p:style>
+          <a:lnRef idx="1">
+            <a:schemeClr val="accent1"/>
+          </a:lnRef>
+          <a:fillRef idx="3">
+            <a:schemeClr val="accent1"/>
+          </a:fillRef>
+          <a:effectRef idx="2">
+            <a:schemeClr val="accent1"/>
+          </a:effectRef>
+          <a:fontRef idx="minor">
+            <a:schemeClr val="lt1"/>
+          </a:fontRef>
+        </p:style>
+        <p:txBody>
+          <a:bodyPr rtlCol="0" anchor="ctr"/>
+          <a:lstStyle/>
+          <a:p>
+            <a:pPr algn="ctr"/>
+            <a:endParaRPr kumimoji="1" lang="ja-JP" altLang="en-US" dirty="0">
+              <a:solidFill>
+                <a:srgbClr val="FF0000"/>
+              </a:solidFill>
+            </a:endParaRPr>
+          </a:p>
+        </p:txBody>
+      </p:sp>
+    </p:spTree>
+    <p:extLst>
+      <p:ext uri="{BB962C8B-B14F-4D97-AF65-F5344CB8AC3E}">
+        <p14:creationId xmlns:p14="http://schemas.microsoft.com/office/powerpoint/2010/main" val="1694020203"/>
+      </p:ext>
+    </p:extLst>
+  </p:cSld>
+  <p:clrMapOvr>
+    <a:masterClrMapping/>
+  </p:clrMapOvr>
+</p:sld>
+</file>
+
+<file path=ppt/slides/slide26.xml><?xml version="1.0" encoding="utf-8"?>
+<p:sld xmlns:a="http://schemas.openxmlformats.org/drawingml/2006/main" xmlns:r="http://schemas.openxmlformats.org/officeDocument/2006/relationships" xmlns:p="http://schemas.openxmlformats.org/presentationml/2006/main">
+  <p:cSld>
+    <p:spTree>
+      <p:nvGrpSpPr>
+        <p:cNvPr id="1" name=""/>
+        <p:cNvGrpSpPr/>
+        <p:nvPr/>
+      </p:nvGrpSpPr>
+      <p:grpSpPr>
+        <a:xfrm>
+          <a:off x="0" y="0"/>
+          <a:ext cx="0" cy="0"/>
+          <a:chOff x="0" y="0"/>
+          <a:chExt cx="0" cy="0"/>
+        </a:xfrm>
+      </p:grpSpPr>
+      <p:pic>
+        <p:nvPicPr>
+          <p:cNvPr id="2" name="図 1"/>
+          <p:cNvPicPr>
+            <a:picLocks noChangeAspect="1"/>
+          </p:cNvPicPr>
+          <p:nvPr/>
+        </p:nvPicPr>
+        <p:blipFill>
+          <a:blip r:embed="rId2"/>
+          <a:stretch>
+            <a:fillRect/>
+          </a:stretch>
+        </p:blipFill>
+        <p:spPr>
+          <a:xfrm>
+            <a:off x="407700" y="2333625"/>
+            <a:ext cx="8356348" cy="2632822"/>
+          </a:xfrm>
+          <a:prstGeom prst="rect">
+            <a:avLst/>
+          </a:prstGeom>
+        </p:spPr>
+      </p:pic>
+      <p:sp>
+        <p:nvSpPr>
+          <p:cNvPr id="3" name="正方形/長方形 2"/>
+          <p:cNvSpPr/>
+          <p:nvPr/>
+        </p:nvSpPr>
+        <p:spPr>
+          <a:xfrm>
+            <a:off x="5038164" y="3845859"/>
+            <a:ext cx="3424518" cy="233082"/>
+          </a:xfrm>
+          <a:prstGeom prst="rect">
+            <a:avLst/>
+          </a:prstGeom>
+          <a:noFill/>
+          <a:ln w="57150">
+            <a:solidFill>
+              <a:srgbClr val="FF0000"/>
+            </a:solidFill>
+          </a:ln>
+        </p:spPr>
+        <p:style>
+          <a:lnRef idx="1">
+            <a:schemeClr val="accent1"/>
+          </a:lnRef>
+          <a:fillRef idx="3">
+            <a:schemeClr val="accent1"/>
+          </a:fillRef>
+          <a:effectRef idx="2">
+            <a:schemeClr val="accent1"/>
+          </a:effectRef>
+          <a:fontRef idx="minor">
+            <a:schemeClr val="lt1"/>
+          </a:fontRef>
+        </p:style>
+        <p:txBody>
+          <a:bodyPr rtlCol="0" anchor="ctr"/>
+          <a:lstStyle/>
+          <a:p>
+            <a:pPr algn="ctr"/>
+            <a:endParaRPr kumimoji="1" lang="ja-JP" altLang="en-US" dirty="0">
+              <a:solidFill>
+                <a:srgbClr val="FF0000"/>
+              </a:solidFill>
+            </a:endParaRPr>
+          </a:p>
+        </p:txBody>
+      </p:sp>
+    </p:spTree>
+    <p:extLst>
+      <p:ext uri="{BB962C8B-B14F-4D97-AF65-F5344CB8AC3E}">
+        <p14:creationId xmlns:p14="http://schemas.microsoft.com/office/powerpoint/2010/main" val="2733443789"/>
+      </p:ext>
+    </p:extLst>
+  </p:cSld>
+  <p:clrMapOvr>
+    <a:masterClrMapping/>
+  </p:clrMapOvr>
+</p:sld>
+</file>
+
+<file path=ppt/slides/slide27.xml><?xml version="1.0" encoding="utf-8"?>
+<p:sld xmlns:a="http://schemas.openxmlformats.org/drawingml/2006/main" xmlns:r="http://schemas.openxmlformats.org/officeDocument/2006/relationships" xmlns:p="http://schemas.openxmlformats.org/presentationml/2006/main">
+  <p:cSld>
+    <p:spTree>
+      <p:nvGrpSpPr>
+        <p:cNvPr id="1" name=""/>
+        <p:cNvGrpSpPr/>
+        <p:nvPr/>
+      </p:nvGrpSpPr>
+      <p:grpSpPr>
+        <a:xfrm>
+          <a:off x="0" y="0"/>
+          <a:ext cx="0" cy="0"/>
+          <a:chOff x="0" y="0"/>
+          <a:chExt cx="0" cy="0"/>
+        </a:xfrm>
+      </p:grpSpPr>
+      <p:pic>
+        <p:nvPicPr>
+          <p:cNvPr id="2" name="図 1"/>
+          <p:cNvPicPr>
+            <a:picLocks noChangeAspect="1"/>
+          </p:cNvPicPr>
+          <p:nvPr/>
+        </p:nvPicPr>
+        <p:blipFill>
+          <a:blip r:embed="rId2"/>
+          <a:stretch>
+            <a:fillRect/>
+          </a:stretch>
+        </p:blipFill>
+        <p:spPr>
+          <a:xfrm>
+            <a:off x="813941" y="1881808"/>
+            <a:ext cx="7541165" cy="3873533"/>
+          </a:xfrm>
+          <a:prstGeom prst="rect">
+            <a:avLst/>
+          </a:prstGeom>
+        </p:spPr>
+      </p:pic>
+    </p:spTree>
+    <p:extLst>
+      <p:ext uri="{BB962C8B-B14F-4D97-AF65-F5344CB8AC3E}">
+        <p14:creationId xmlns:p14="http://schemas.microsoft.com/office/powerpoint/2010/main" val="2344066348"/>
+      </p:ext>
+    </p:extLst>
+  </p:cSld>
+  <p:clrMapOvr>
+    <a:masterClrMapping/>
+  </p:clrMapOvr>
 </p:sld>
 </file>
 
@@ -16015,6 +17811,156 @@
       </p:par>
     </p:tnLst>
   </p:timing>
+</p:sld>
+</file>
+
+<file path=ppt/slides/slide9.xml><?xml version="1.0" encoding="utf-8"?>
+<p:sld xmlns:a="http://schemas.openxmlformats.org/drawingml/2006/main" xmlns:r="http://schemas.openxmlformats.org/officeDocument/2006/relationships" xmlns:p="http://schemas.openxmlformats.org/presentationml/2006/main">
+  <p:cSld>
+    <p:spTree>
+      <p:nvGrpSpPr>
+        <p:cNvPr id="1" name=""/>
+        <p:cNvGrpSpPr/>
+        <p:nvPr/>
+      </p:nvGrpSpPr>
+      <p:grpSpPr>
+        <a:xfrm>
+          <a:off x="0" y="0"/>
+          <a:ext cx="0" cy="0"/>
+          <a:chOff x="0" y="0"/>
+          <a:chExt cx="0" cy="0"/>
+        </a:xfrm>
+      </p:grpSpPr>
+      <p:pic>
+        <p:nvPicPr>
+          <p:cNvPr id="11" name="図 10"/>
+          <p:cNvPicPr>
+            <a:picLocks noChangeAspect="1"/>
+          </p:cNvPicPr>
+          <p:nvPr/>
+        </p:nvPicPr>
+        <p:blipFill>
+          <a:blip r:embed="rId2"/>
+          <a:stretch>
+            <a:fillRect/>
+          </a:stretch>
+        </p:blipFill>
+        <p:spPr>
+          <a:xfrm>
+            <a:off x="1183341" y="1520608"/>
+            <a:ext cx="6472518" cy="4259334"/>
+          </a:xfrm>
+          <a:prstGeom prst="rect">
+            <a:avLst/>
+          </a:prstGeom>
+        </p:spPr>
+      </p:pic>
+      <p:sp>
+        <p:nvSpPr>
+          <p:cNvPr id="8" name="正方形/長方形 7"/>
+          <p:cNvSpPr/>
+          <p:nvPr/>
+        </p:nvSpPr>
+        <p:spPr>
+          <a:xfrm>
+            <a:off x="3165067" y="3424518"/>
+            <a:ext cx="4437005" cy="359082"/>
+          </a:xfrm>
+          <a:prstGeom prst="rect">
+            <a:avLst/>
+          </a:prstGeom>
+          <a:noFill/>
+          <a:ln w="57150">
+            <a:solidFill>
+              <a:srgbClr val="FF0000"/>
+            </a:solidFill>
+          </a:ln>
+        </p:spPr>
+        <p:style>
+          <a:lnRef idx="1">
+            <a:schemeClr val="accent1"/>
+          </a:lnRef>
+          <a:fillRef idx="3">
+            <a:schemeClr val="accent1"/>
+          </a:fillRef>
+          <a:effectRef idx="2">
+            <a:schemeClr val="accent1"/>
+          </a:effectRef>
+          <a:fontRef idx="minor">
+            <a:schemeClr val="lt1"/>
+          </a:fontRef>
+        </p:style>
+        <p:txBody>
+          <a:bodyPr rtlCol="0" anchor="ctr"/>
+          <a:lstStyle/>
+          <a:p>
+            <a:pPr algn="ctr"/>
+            <a:endParaRPr kumimoji="1" lang="ja-JP" altLang="en-US" dirty="0">
+              <a:solidFill>
+                <a:srgbClr val="FF0000"/>
+              </a:solidFill>
+            </a:endParaRPr>
+          </a:p>
+        </p:txBody>
+      </p:sp>
+      <p:sp>
+        <p:nvSpPr>
+          <p:cNvPr id="13" name="正方形/長方形 12"/>
+          <p:cNvSpPr/>
+          <p:nvPr/>
+        </p:nvSpPr>
+        <p:spPr>
+          <a:xfrm>
+            <a:off x="2802256" y="5217460"/>
+            <a:ext cx="2670958" cy="361086"/>
+          </a:xfrm>
+          <a:prstGeom prst="rect">
+            <a:avLst/>
+          </a:prstGeom>
+          <a:noFill/>
+          <a:ln w="57150">
+            <a:solidFill>
+              <a:srgbClr val="FF0000"/>
+            </a:solidFill>
+          </a:ln>
+        </p:spPr>
+        <p:style>
+          <a:lnRef idx="1">
+            <a:schemeClr val="accent1"/>
+          </a:lnRef>
+          <a:fillRef idx="3">
+            <a:schemeClr val="accent1"/>
+          </a:fillRef>
+          <a:effectRef idx="2">
+            <a:schemeClr val="accent1"/>
+          </a:effectRef>
+          <a:fontRef idx="minor">
+            <a:schemeClr val="lt1"/>
+          </a:fontRef>
+        </p:style>
+        <p:txBody>
+          <a:bodyPr rtlCol="0" anchor="ctr"/>
+          <a:lstStyle/>
+          <a:p>
+            <a:pPr algn="ctr"/>
+            <a:endParaRPr kumimoji="1" lang="ja-JP" altLang="en-US" dirty="0">
+              <a:solidFill>
+                <a:srgbClr val="FF0000"/>
+              </a:solidFill>
+            </a:endParaRPr>
+          </a:p>
+        </p:txBody>
+      </p:sp>
+    </p:spTree>
+    <p:extLst>
+      <p:ext uri="{BB962C8B-B14F-4D97-AF65-F5344CB8AC3E}">
+        <p14:creationId xmlns:p14="http://schemas.microsoft.com/office/powerpoint/2010/main" val="2380719541"/>
+      </p:ext>
+    </p:extLst>
+  </p:cSld>
+  <p:clrMapOvr>
+    <a:masterClrMapping/>
+  </p:clrMapOvr>
 </p:sld>
 </file>
 

</xml_diff>

<commit_message>
Add Excel image #1817
</commit_message>
<xml_diff>
--- a/source/UnitTest/images_UnitTestGuide/materialUnitTestGuide.pptx
+++ b/source/UnitTest/images_UnitTestGuide/materialUnitTestGuide.pptx
@@ -5,7 +5,7 @@
     <p:sldMasterId id="2147483648" r:id="rId1"/>
   </p:sldMasterIdLst>
   <p:notesMasterIdLst>
-    <p:notesMasterId r:id="rId29"/>
+    <p:notesMasterId r:id="rId30"/>
   </p:notesMasterIdLst>
   <p:sldIdLst>
     <p:sldId id="335" r:id="rId2"/>
@@ -35,6 +35,7 @@
     <p:sldId id="359" r:id="rId26"/>
     <p:sldId id="360" r:id="rId27"/>
     <p:sldId id="362" r:id="rId28"/>
+    <p:sldId id="363" r:id="rId29"/>
   </p:sldIdLst>
   <p:sldSz cx="9144000" cy="6858000" type="screen4x3"/>
   <p:notesSz cx="6858000" cy="9144000"/>
@@ -169,6 +170,7 @@
             <p14:sldId id="359"/>
             <p14:sldId id="360"/>
             <p14:sldId id="362"/>
+            <p14:sldId id="363"/>
           </p14:sldIdLst>
         </p14:section>
       </p14:sectionLst>
@@ -273,7 +275,7 @@
           <a:p>
             <a:fld id="{3BB47352-BF5A-4CD2-B029-996118CD8E01}" type="datetimeFigureOut">
               <a:rPr kumimoji="1" lang="ja-JP" altLang="en-US" smtClean="0"/>
-              <a:t>2017/9/25</a:t>
+              <a:t>2017/9/26</a:t>
             </a:fld>
             <a:endParaRPr kumimoji="1" lang="ja-JP" altLang="en-US"/>
           </a:p>
@@ -1426,7 +1428,7 @@
           <a:p>
             <a:fld id="{7B9B12EC-6AA0-374B-A2D3-850081A07A26}" type="datetimeFigureOut">
               <a:rPr kumimoji="1" lang="ja-JP" altLang="en-US" smtClean="0"/>
-              <a:t>2017/9/25</a:t>
+              <a:t>2017/9/26</a:t>
             </a:fld>
             <a:endParaRPr kumimoji="1" lang="ja-JP" altLang="en-US"/>
           </a:p>
@@ -1628,7 +1630,7 @@
           <a:p>
             <a:fld id="{7B9B12EC-6AA0-374B-A2D3-850081A07A26}" type="datetimeFigureOut">
               <a:rPr kumimoji="1" lang="ja-JP" altLang="en-US" smtClean="0"/>
-              <a:t>2017/9/25</a:t>
+              <a:t>2017/9/26</a:t>
             </a:fld>
             <a:endParaRPr kumimoji="1" lang="ja-JP" altLang="en-US"/>
           </a:p>
@@ -1840,7 +1842,7 @@
           <a:p>
             <a:fld id="{7B9B12EC-6AA0-374B-A2D3-850081A07A26}" type="datetimeFigureOut">
               <a:rPr kumimoji="1" lang="ja-JP" altLang="en-US" smtClean="0"/>
-              <a:t>2017/9/25</a:t>
+              <a:t>2017/9/26</a:t>
             </a:fld>
             <a:endParaRPr kumimoji="1" lang="ja-JP" altLang="en-US"/>
           </a:p>
@@ -2042,7 +2044,7 @@
           <a:p>
             <a:fld id="{7B9B12EC-6AA0-374B-A2D3-850081A07A26}" type="datetimeFigureOut">
               <a:rPr kumimoji="1" lang="ja-JP" altLang="en-US" smtClean="0"/>
-              <a:t>2017/9/25</a:t>
+              <a:t>2017/9/26</a:t>
             </a:fld>
             <a:endParaRPr kumimoji="1" lang="ja-JP" altLang="en-US"/>
           </a:p>
@@ -2288,7 +2290,7 @@
           <a:p>
             <a:fld id="{7B9B12EC-6AA0-374B-A2D3-850081A07A26}" type="datetimeFigureOut">
               <a:rPr kumimoji="1" lang="ja-JP" altLang="en-US" smtClean="0"/>
-              <a:t>2017/9/25</a:t>
+              <a:t>2017/9/26</a:t>
             </a:fld>
             <a:endParaRPr kumimoji="1" lang="ja-JP" altLang="en-US"/>
           </a:p>
@@ -2640,7 +2642,7 @@
           <a:p>
             <a:fld id="{7B9B12EC-6AA0-374B-A2D3-850081A07A26}" type="datetimeFigureOut">
               <a:rPr kumimoji="1" lang="ja-JP" altLang="en-US" smtClean="0"/>
-              <a:t>2017/9/25</a:t>
+              <a:t>2017/9/26</a:t>
             </a:fld>
             <a:endParaRPr kumimoji="1" lang="ja-JP" altLang="en-US"/>
           </a:p>
@@ -3126,7 +3128,7 @@
           <a:p>
             <a:fld id="{7B9B12EC-6AA0-374B-A2D3-850081A07A26}" type="datetimeFigureOut">
               <a:rPr kumimoji="1" lang="ja-JP" altLang="en-US" smtClean="0"/>
-              <a:t>2017/9/25</a:t>
+              <a:t>2017/9/26</a:t>
             </a:fld>
             <a:endParaRPr kumimoji="1" lang="ja-JP" altLang="en-US"/>
           </a:p>
@@ -3244,7 +3246,7 @@
           <a:p>
             <a:fld id="{7B9B12EC-6AA0-374B-A2D3-850081A07A26}" type="datetimeFigureOut">
               <a:rPr kumimoji="1" lang="ja-JP" altLang="en-US" smtClean="0"/>
-              <a:t>2017/9/25</a:t>
+              <a:t>2017/9/26</a:t>
             </a:fld>
             <a:endParaRPr kumimoji="1" lang="ja-JP" altLang="en-US"/>
           </a:p>
@@ -3339,7 +3341,7 @@
           <a:p>
             <a:fld id="{7B9B12EC-6AA0-374B-A2D3-850081A07A26}" type="datetimeFigureOut">
               <a:rPr kumimoji="1" lang="ja-JP" altLang="en-US" smtClean="0"/>
-              <a:t>2017/9/25</a:t>
+              <a:t>2017/9/26</a:t>
             </a:fld>
             <a:endParaRPr kumimoji="1" lang="ja-JP" altLang="en-US"/>
           </a:p>
@@ -3648,7 +3650,7 @@
           <a:p>
             <a:fld id="{7B9B12EC-6AA0-374B-A2D3-850081A07A26}" type="datetimeFigureOut">
               <a:rPr kumimoji="1" lang="ja-JP" altLang="en-US" smtClean="0"/>
-              <a:t>2017/9/25</a:t>
+              <a:t>2017/9/26</a:t>
             </a:fld>
             <a:endParaRPr kumimoji="1" lang="ja-JP" altLang="en-US"/>
           </a:p>
@@ -3901,7 +3903,7 @@
           <a:p>
             <a:fld id="{7B9B12EC-6AA0-374B-A2D3-850081A07A26}" type="datetimeFigureOut">
               <a:rPr kumimoji="1" lang="ja-JP" altLang="en-US" smtClean="0"/>
-              <a:t>2017/9/25</a:t>
+              <a:t>2017/9/26</a:t>
             </a:fld>
             <a:endParaRPr kumimoji="1" lang="ja-JP" altLang="en-US"/>
           </a:p>
@@ -4146,7 +4148,7 @@
           <a:p>
             <a:fld id="{7B9B12EC-6AA0-374B-A2D3-850081A07A26}" type="datetimeFigureOut">
               <a:rPr kumimoji="1" lang="ja-JP" altLang="en-US" smtClean="0"/>
-              <a:t>2017/9/25</a:t>
+              <a:t>2017/9/26</a:t>
             </a:fld>
             <a:endParaRPr kumimoji="1" lang="ja-JP" altLang="en-US"/>
           </a:p>
@@ -8284,6 +8286,60 @@
     <p:extLst>
       <p:ext uri="{BB962C8B-B14F-4D97-AF65-F5344CB8AC3E}">
         <p14:creationId xmlns:p14="http://schemas.microsoft.com/office/powerpoint/2010/main" val="2344066348"/>
+      </p:ext>
+    </p:extLst>
+  </p:cSld>
+  <p:clrMapOvr>
+    <a:masterClrMapping/>
+  </p:clrMapOvr>
+</p:sld>
+</file>
+
+<file path=ppt/slides/slide28.xml><?xml version="1.0" encoding="utf-8"?>
+<p:sld xmlns:a="http://schemas.openxmlformats.org/drawingml/2006/main" xmlns:r="http://schemas.openxmlformats.org/officeDocument/2006/relationships" xmlns:p="http://schemas.openxmlformats.org/presentationml/2006/main">
+  <p:cSld>
+    <p:spTree>
+      <p:nvGrpSpPr>
+        <p:cNvPr id="1" name=""/>
+        <p:cNvGrpSpPr/>
+        <p:nvPr/>
+      </p:nvGrpSpPr>
+      <p:grpSpPr>
+        <a:xfrm>
+          <a:off x="0" y="0"/>
+          <a:ext cx="0" cy="0"/>
+          <a:chOff x="0" y="0"/>
+          <a:chExt cx="0" cy="0"/>
+        </a:xfrm>
+      </p:grpSpPr>
+      <p:pic>
+        <p:nvPicPr>
+          <p:cNvPr id="5" name="図 4"/>
+          <p:cNvPicPr>
+            <a:picLocks noChangeAspect="1"/>
+          </p:cNvPicPr>
+          <p:nvPr/>
+        </p:nvPicPr>
+        <p:blipFill>
+          <a:blip r:embed="rId2"/>
+          <a:stretch>
+            <a:fillRect/>
+          </a:stretch>
+        </p:blipFill>
+        <p:spPr>
+          <a:xfrm>
+            <a:off x="233082" y="1219200"/>
+            <a:ext cx="8590409" cy="4724030"/>
+          </a:xfrm>
+          <a:prstGeom prst="rect">
+            <a:avLst/>
+          </a:prstGeom>
+        </p:spPr>
+      </p:pic>
+    </p:spTree>
+    <p:extLst>
+      <p:ext uri="{BB962C8B-B14F-4D97-AF65-F5344CB8AC3E}">
+        <p14:creationId xmlns:p14="http://schemas.microsoft.com/office/powerpoint/2010/main" val="273263900"/>
       </p:ext>
     </p:extLst>
   </p:cSld>

</xml_diff>

<commit_message>
Fixed image of implementation chapter #1817
</commit_message>
<xml_diff>
--- a/source/UnitTest/images_UnitTestGuide/materialUnitTestGuide.pptx
+++ b/source/UnitTest/images_UnitTestGuide/materialUnitTestGuide.pptx
@@ -275,7 +275,7 @@
           <a:p>
             <a:fld id="{3BB47352-BF5A-4CD2-B029-996118CD8E01}" type="datetimeFigureOut">
               <a:rPr kumimoji="1" lang="ja-JP" altLang="en-US" smtClean="0"/>
-              <a:t>2017/9/26</a:t>
+              <a:t>2017/9/28</a:t>
             </a:fld>
             <a:endParaRPr kumimoji="1" lang="ja-JP" altLang="en-US"/>
           </a:p>
@@ -1428,7 +1428,7 @@
           <a:p>
             <a:fld id="{7B9B12EC-6AA0-374B-A2D3-850081A07A26}" type="datetimeFigureOut">
               <a:rPr kumimoji="1" lang="ja-JP" altLang="en-US" smtClean="0"/>
-              <a:t>2017/9/26</a:t>
+              <a:t>2017/9/28</a:t>
             </a:fld>
             <a:endParaRPr kumimoji="1" lang="ja-JP" altLang="en-US"/>
           </a:p>
@@ -1630,7 +1630,7 @@
           <a:p>
             <a:fld id="{7B9B12EC-6AA0-374B-A2D3-850081A07A26}" type="datetimeFigureOut">
               <a:rPr kumimoji="1" lang="ja-JP" altLang="en-US" smtClean="0"/>
-              <a:t>2017/9/26</a:t>
+              <a:t>2017/9/28</a:t>
             </a:fld>
             <a:endParaRPr kumimoji="1" lang="ja-JP" altLang="en-US"/>
           </a:p>
@@ -1842,7 +1842,7 @@
           <a:p>
             <a:fld id="{7B9B12EC-6AA0-374B-A2D3-850081A07A26}" type="datetimeFigureOut">
               <a:rPr kumimoji="1" lang="ja-JP" altLang="en-US" smtClean="0"/>
-              <a:t>2017/9/26</a:t>
+              <a:t>2017/9/28</a:t>
             </a:fld>
             <a:endParaRPr kumimoji="1" lang="ja-JP" altLang="en-US"/>
           </a:p>
@@ -2044,7 +2044,7 @@
           <a:p>
             <a:fld id="{7B9B12EC-6AA0-374B-A2D3-850081A07A26}" type="datetimeFigureOut">
               <a:rPr kumimoji="1" lang="ja-JP" altLang="en-US" smtClean="0"/>
-              <a:t>2017/9/26</a:t>
+              <a:t>2017/9/28</a:t>
             </a:fld>
             <a:endParaRPr kumimoji="1" lang="ja-JP" altLang="en-US"/>
           </a:p>
@@ -2290,7 +2290,7 @@
           <a:p>
             <a:fld id="{7B9B12EC-6AA0-374B-A2D3-850081A07A26}" type="datetimeFigureOut">
               <a:rPr kumimoji="1" lang="ja-JP" altLang="en-US" smtClean="0"/>
-              <a:t>2017/9/26</a:t>
+              <a:t>2017/9/28</a:t>
             </a:fld>
             <a:endParaRPr kumimoji="1" lang="ja-JP" altLang="en-US"/>
           </a:p>
@@ -2642,7 +2642,7 @@
           <a:p>
             <a:fld id="{7B9B12EC-6AA0-374B-A2D3-850081A07A26}" type="datetimeFigureOut">
               <a:rPr kumimoji="1" lang="ja-JP" altLang="en-US" smtClean="0"/>
-              <a:t>2017/9/26</a:t>
+              <a:t>2017/9/28</a:t>
             </a:fld>
             <a:endParaRPr kumimoji="1" lang="ja-JP" altLang="en-US"/>
           </a:p>
@@ -3128,7 +3128,7 @@
           <a:p>
             <a:fld id="{7B9B12EC-6AA0-374B-A2D3-850081A07A26}" type="datetimeFigureOut">
               <a:rPr kumimoji="1" lang="ja-JP" altLang="en-US" smtClean="0"/>
-              <a:t>2017/9/26</a:t>
+              <a:t>2017/9/28</a:t>
             </a:fld>
             <a:endParaRPr kumimoji="1" lang="ja-JP" altLang="en-US"/>
           </a:p>
@@ -3246,7 +3246,7 @@
           <a:p>
             <a:fld id="{7B9B12EC-6AA0-374B-A2D3-850081A07A26}" type="datetimeFigureOut">
               <a:rPr kumimoji="1" lang="ja-JP" altLang="en-US" smtClean="0"/>
-              <a:t>2017/9/26</a:t>
+              <a:t>2017/9/28</a:t>
             </a:fld>
             <a:endParaRPr kumimoji="1" lang="ja-JP" altLang="en-US"/>
           </a:p>
@@ -3341,7 +3341,7 @@
           <a:p>
             <a:fld id="{7B9B12EC-6AA0-374B-A2D3-850081A07A26}" type="datetimeFigureOut">
               <a:rPr kumimoji="1" lang="ja-JP" altLang="en-US" smtClean="0"/>
-              <a:t>2017/9/26</a:t>
+              <a:t>2017/9/28</a:t>
             </a:fld>
             <a:endParaRPr kumimoji="1" lang="ja-JP" altLang="en-US"/>
           </a:p>
@@ -3650,7 +3650,7 @@
           <a:p>
             <a:fld id="{7B9B12EC-6AA0-374B-A2D3-850081A07A26}" type="datetimeFigureOut">
               <a:rPr kumimoji="1" lang="ja-JP" altLang="en-US" smtClean="0"/>
-              <a:t>2017/9/26</a:t>
+              <a:t>2017/9/28</a:t>
             </a:fld>
             <a:endParaRPr kumimoji="1" lang="ja-JP" altLang="en-US"/>
           </a:p>
@@ -3903,7 +3903,7 @@
           <a:p>
             <a:fld id="{7B9B12EC-6AA0-374B-A2D3-850081A07A26}" type="datetimeFigureOut">
               <a:rPr kumimoji="1" lang="ja-JP" altLang="en-US" smtClean="0"/>
-              <a:t>2017/9/26</a:t>
+              <a:t>2017/9/28</a:t>
             </a:fld>
             <a:endParaRPr kumimoji="1" lang="ja-JP" altLang="en-US"/>
           </a:p>
@@ -4148,7 +4148,7 @@
           <a:p>
             <a:fld id="{7B9B12EC-6AA0-374B-A2D3-850081A07A26}" type="datetimeFigureOut">
               <a:rPr kumimoji="1" lang="ja-JP" altLang="en-US" smtClean="0"/>
-              <a:t>2017/9/26</a:t>
+              <a:t>2017/9/28</a:t>
             </a:fld>
             <a:endParaRPr kumimoji="1" lang="ja-JP" altLang="en-US"/>
           </a:p>
@@ -5276,16 +5276,15 @@
           </p:cNvPicPr>
           <p:nvPr/>
         </p:nvPicPr>
-        <p:blipFill>
+        <p:blipFill rotWithShape="1">
           <a:blip r:embed="rId2"/>
-          <a:stretch>
-            <a:fillRect/>
-          </a:stretch>
+          <a:srcRect r="-15751"/>
+          <a:stretch/>
         </p:blipFill>
         <p:spPr>
           <a:xfrm>
-            <a:off x="1557253" y="968468"/>
-            <a:ext cx="5717884" cy="5055813"/>
+            <a:off x="1557252" y="968468"/>
+            <a:ext cx="6618559" cy="5055813"/>
           </a:xfrm>
           <a:prstGeom prst="rect">
             <a:avLst/>
@@ -5340,9 +5339,57 @@
           </a:p>
         </p:txBody>
       </p:sp>
+      <p:sp>
+        <p:nvSpPr>
+          <p:cNvPr id="13" name="正方形/長方形 12"/>
+          <p:cNvSpPr/>
+          <p:nvPr/>
+        </p:nvSpPr>
+        <p:spPr>
+          <a:xfrm>
+            <a:off x="3007961" y="4276303"/>
+            <a:ext cx="4181731" cy="869438"/>
+          </a:xfrm>
+          <a:prstGeom prst="rect">
+            <a:avLst/>
+          </a:prstGeom>
+          <a:noFill/>
+          <a:ln w="57150">
+            <a:solidFill>
+              <a:srgbClr val="FF0000"/>
+            </a:solidFill>
+          </a:ln>
+        </p:spPr>
+        <p:style>
+          <a:lnRef idx="1">
+            <a:schemeClr val="accent1"/>
+          </a:lnRef>
+          <a:fillRef idx="3">
+            <a:schemeClr val="accent1"/>
+          </a:fillRef>
+          <a:effectRef idx="2">
+            <a:schemeClr val="accent1"/>
+          </a:effectRef>
+          <a:fontRef idx="minor">
+            <a:schemeClr val="lt1"/>
+          </a:fontRef>
+        </p:style>
+        <p:txBody>
+          <a:bodyPr rtlCol="0" anchor="ctr"/>
+          <a:lstStyle/>
+          <a:p>
+            <a:pPr algn="ctr"/>
+            <a:endParaRPr kumimoji="1" lang="ja-JP" altLang="en-US" dirty="0">
+              <a:solidFill>
+                <a:srgbClr val="FF0000"/>
+              </a:solidFill>
+            </a:endParaRPr>
+          </a:p>
+        </p:txBody>
+      </p:sp>
       <p:pic>
         <p:nvPicPr>
-          <p:cNvPr id="12" name="図 11"/>
+          <p:cNvPr id="2" name="図 1"/>
           <p:cNvPicPr>
             <a:picLocks noChangeAspect="1"/>
           </p:cNvPicPr>
@@ -5356,8 +5403,8 @@
         </p:blipFill>
         <p:spPr>
           <a:xfrm>
-            <a:off x="2936246" y="5564684"/>
-            <a:ext cx="3464553" cy="459597"/>
+            <a:off x="3002337" y="5542093"/>
+            <a:ext cx="5356823" cy="425452"/>
           </a:xfrm>
           <a:prstGeom prst="rect">
             <a:avLst/>
@@ -5366,14 +5413,14 @@
       </p:pic>
       <p:sp>
         <p:nvSpPr>
-          <p:cNvPr id="13" name="正方形/長方形 12"/>
+          <p:cNvPr id="7" name="正方形/長方形 6"/>
           <p:cNvSpPr/>
           <p:nvPr/>
         </p:nvSpPr>
         <p:spPr>
           <a:xfrm>
-            <a:off x="3007961" y="4276303"/>
-            <a:ext cx="4181731" cy="869438"/>
+            <a:off x="2972103" y="5522674"/>
+            <a:ext cx="5167850" cy="426942"/>
           </a:xfrm>
           <a:prstGeom prst="rect">
             <a:avLst/>
@@ -5452,13 +5499,37 @@
         </p:nvPicPr>
         <p:blipFill rotWithShape="1">
           <a:blip r:embed="rId2"/>
-          <a:srcRect r="-2153"/>
+          <a:srcRect l="-1" r="-23491"/>
           <a:stretch/>
         </p:blipFill>
         <p:spPr>
           <a:xfrm>
-            <a:off x="1316977" y="1995475"/>
-            <a:ext cx="6805047" cy="3360108"/>
+            <a:off x="720251" y="1995475"/>
+            <a:ext cx="8226525" cy="3360108"/>
+          </a:xfrm>
+          <a:prstGeom prst="rect">
+            <a:avLst/>
+          </a:prstGeom>
+        </p:spPr>
+      </p:pic>
+      <p:pic>
+        <p:nvPicPr>
+          <p:cNvPr id="2" name="図 1"/>
+          <p:cNvPicPr>
+            <a:picLocks noChangeAspect="1"/>
+          </p:cNvPicPr>
+          <p:nvPr/>
+        </p:nvPicPr>
+        <p:blipFill>
+          <a:blip r:embed="rId3"/>
+          <a:stretch>
+            <a:fillRect/>
+          </a:stretch>
+        </p:blipFill>
+        <p:spPr>
+          <a:xfrm>
+            <a:off x="1925497" y="3254732"/>
+            <a:ext cx="5497280" cy="349650"/>
           </a:xfrm>
           <a:prstGeom prst="rect">
             <a:avLst/>
@@ -5473,7 +5544,7 @@
         </p:nvSpPr>
         <p:spPr>
           <a:xfrm>
-            <a:off x="2812937" y="3244195"/>
+            <a:off x="2239202" y="3243672"/>
             <a:ext cx="5165651" cy="371770"/>
           </a:xfrm>
           <a:prstGeom prst="rect">
@@ -5513,6 +5584,54 @@
           </a:p>
         </p:txBody>
       </p:sp>
+      <p:pic>
+        <p:nvPicPr>
+          <p:cNvPr id="4" name="図 3"/>
+          <p:cNvPicPr>
+            <a:picLocks noChangeAspect="1"/>
+          </p:cNvPicPr>
+          <p:nvPr/>
+        </p:nvPicPr>
+        <p:blipFill>
+          <a:blip r:embed="rId4"/>
+          <a:stretch>
+            <a:fillRect/>
+          </a:stretch>
+        </p:blipFill>
+        <p:spPr>
+          <a:xfrm>
+            <a:off x="2113693" y="4849975"/>
+            <a:ext cx="6468783" cy="386196"/>
+          </a:xfrm>
+          <a:prstGeom prst="rect">
+            <a:avLst/>
+          </a:prstGeom>
+        </p:spPr>
+      </p:pic>
+      <p:pic>
+        <p:nvPicPr>
+          <p:cNvPr id="5" name="図 4"/>
+          <p:cNvPicPr>
+            <a:picLocks noChangeAspect="1"/>
+          </p:cNvPicPr>
+          <p:nvPr/>
+        </p:nvPicPr>
+        <p:blipFill>
+          <a:blip r:embed="rId5"/>
+          <a:stretch>
+            <a:fillRect/>
+          </a:stretch>
+        </p:blipFill>
+        <p:spPr>
+          <a:xfrm>
+            <a:off x="8504199" y="4839988"/>
+            <a:ext cx="228270" cy="365232"/>
+          </a:xfrm>
+          <a:prstGeom prst="rect">
+            <a:avLst/>
+          </a:prstGeom>
+        </p:spPr>
+      </p:pic>
       <p:sp>
         <p:nvSpPr>
           <p:cNvPr id="13" name="正方形/長方形 12"/>
@@ -5521,8 +5640,8 @@
         </p:nvSpPr>
         <p:spPr>
           <a:xfrm>
-            <a:off x="2707340" y="4864685"/>
-            <a:ext cx="2510117" cy="340658"/>
+            <a:off x="2059906" y="4846632"/>
+            <a:ext cx="6618776" cy="350645"/>
           </a:xfrm>
           <a:prstGeom prst="rect">
             <a:avLst/>
@@ -5614,6 +5733,30 @@
           </a:prstGeom>
         </p:spPr>
       </p:pic>
+      <p:pic>
+        <p:nvPicPr>
+          <p:cNvPr id="3" name="図 2"/>
+          <p:cNvPicPr>
+            <a:picLocks noChangeAspect="1"/>
+          </p:cNvPicPr>
+          <p:nvPr/>
+        </p:nvPicPr>
+        <p:blipFill>
+          <a:blip r:embed="rId3"/>
+          <a:stretch>
+            <a:fillRect/>
+          </a:stretch>
+        </p:blipFill>
+        <p:spPr>
+          <a:xfrm>
+            <a:off x="2415246" y="3281080"/>
+            <a:ext cx="5455765" cy="372876"/>
+          </a:xfrm>
+          <a:prstGeom prst="rect">
+            <a:avLst/>
+          </a:prstGeom>
+        </p:spPr>
+      </p:pic>
       <p:sp>
         <p:nvSpPr>
           <p:cNvPr id="8" name="正方形/長方形 7"/>
@@ -5801,16 +5944,63 @@
           </p:cNvPicPr>
           <p:nvPr/>
         </p:nvPicPr>
+        <p:blipFill rotWithShape="1">
+          <a:blip r:embed="rId2"/>
+          <a:srcRect l="-1" r="-41360" b="-225"/>
+          <a:stretch/>
+        </p:blipFill>
+        <p:spPr>
+          <a:xfrm>
+            <a:off x="323290" y="1594222"/>
+            <a:ext cx="8462121" cy="3999753"/>
+          </a:xfrm>
+          <a:prstGeom prst="rect">
+            <a:avLst/>
+          </a:prstGeom>
+        </p:spPr>
+      </p:pic>
+      <p:pic>
+        <p:nvPicPr>
+          <p:cNvPr id="10" name="図 9"/>
+          <p:cNvPicPr>
+            <a:picLocks noChangeAspect="1"/>
+          </p:cNvPicPr>
+          <p:nvPr/>
+        </p:nvPicPr>
         <p:blipFill>
-          <a:blip r:embed="rId2"/>
+          <a:blip r:embed="rId3"/>
           <a:stretch>
             <a:fillRect/>
           </a:stretch>
         </p:blipFill>
         <p:spPr>
           <a:xfrm>
-            <a:off x="1488702" y="1594223"/>
-            <a:ext cx="5986182" cy="3990788"/>
+            <a:off x="1936377" y="5069822"/>
+            <a:ext cx="2635623" cy="405891"/>
+          </a:xfrm>
+          <a:prstGeom prst="rect">
+            <a:avLst/>
+          </a:prstGeom>
+        </p:spPr>
+      </p:pic>
+      <p:pic>
+        <p:nvPicPr>
+          <p:cNvPr id="2" name="図 1"/>
+          <p:cNvPicPr>
+            <a:picLocks noChangeAspect="1"/>
+          </p:cNvPicPr>
+          <p:nvPr/>
+        </p:nvPicPr>
+        <p:blipFill>
+          <a:blip r:embed="rId4"/>
+          <a:stretch>
+            <a:fillRect/>
+          </a:stretch>
+        </p:blipFill>
+        <p:spPr>
+          <a:xfrm>
+            <a:off x="1166622" y="2497980"/>
+            <a:ext cx="6002342" cy="410232"/>
           </a:xfrm>
           <a:prstGeom prst="rect">
             <a:avLst/>
@@ -5825,8 +6015,8 @@
         </p:nvSpPr>
         <p:spPr>
           <a:xfrm>
-            <a:off x="2689411" y="2474260"/>
-            <a:ext cx="4482353" cy="394447"/>
+            <a:off x="1504302" y="2474278"/>
+            <a:ext cx="5628804" cy="394447"/>
           </a:xfrm>
           <a:prstGeom prst="rect">
             <a:avLst/>
@@ -5865,6 +6055,54 @@
           </a:p>
         </p:txBody>
       </p:sp>
+      <p:pic>
+        <p:nvPicPr>
+          <p:cNvPr id="3" name="図 2"/>
+          <p:cNvPicPr>
+            <a:picLocks noChangeAspect="1"/>
+          </p:cNvPicPr>
+          <p:nvPr/>
+        </p:nvPicPr>
+        <p:blipFill>
+          <a:blip r:embed="rId5"/>
+          <a:stretch>
+            <a:fillRect/>
+          </a:stretch>
+        </p:blipFill>
+        <p:spPr>
+          <a:xfrm>
+            <a:off x="1918448" y="4179653"/>
+            <a:ext cx="6741458" cy="444048"/>
+          </a:xfrm>
+          <a:prstGeom prst="rect">
+            <a:avLst/>
+          </a:prstGeom>
+        </p:spPr>
+      </p:pic>
+      <p:pic>
+        <p:nvPicPr>
+          <p:cNvPr id="9" name="図 8"/>
+          <p:cNvPicPr>
+            <a:picLocks noChangeAspect="1"/>
+          </p:cNvPicPr>
+          <p:nvPr/>
+        </p:nvPicPr>
+        <p:blipFill>
+          <a:blip r:embed="rId6"/>
+          <a:stretch>
+            <a:fillRect/>
+          </a:stretch>
+        </p:blipFill>
+        <p:spPr>
+          <a:xfrm>
+            <a:off x="1918448" y="4629474"/>
+            <a:ext cx="6155526" cy="424519"/>
+          </a:xfrm>
+          <a:prstGeom prst="rect">
+            <a:avLst/>
+          </a:prstGeom>
+        </p:spPr>
+      </p:pic>
       <p:sp>
         <p:nvSpPr>
           <p:cNvPr id="4" name="正方形/長方形 3"/>
@@ -5873,8 +6111,8 @@
         </p:nvSpPr>
         <p:spPr>
           <a:xfrm>
-            <a:off x="3012142" y="4195482"/>
-            <a:ext cx="3514164" cy="1272988"/>
+            <a:off x="1918448" y="4195482"/>
+            <a:ext cx="6741458" cy="858511"/>
           </a:xfrm>
           <a:prstGeom prst="rect">
             <a:avLst/>
@@ -8314,22 +8552,21 @@
       </p:grpSpPr>
       <p:pic>
         <p:nvPicPr>
-          <p:cNvPr id="5" name="図 4"/>
+          <p:cNvPr id="2" name="図 1"/>
           <p:cNvPicPr>
             <a:picLocks noChangeAspect="1"/>
           </p:cNvPicPr>
           <p:nvPr/>
         </p:nvPicPr>
-        <p:blipFill>
+        <p:blipFill rotWithShape="1">
           <a:blip r:embed="rId2"/>
-          <a:stretch>
-            <a:fillRect/>
-          </a:stretch>
+          <a:srcRect l="1" r="115"/>
+          <a:stretch/>
         </p:blipFill>
         <p:spPr>
           <a:xfrm>
-            <a:off x="233082" y="1219200"/>
-            <a:ext cx="8590409" cy="4724030"/>
+            <a:off x="233082" y="2512206"/>
+            <a:ext cx="8739468" cy="1994675"/>
           </a:xfrm>
           <a:prstGeom prst="rect">
             <a:avLst/>
@@ -17889,22 +18126,21 @@
       </p:grpSpPr>
       <p:pic>
         <p:nvPicPr>
-          <p:cNvPr id="11" name="図 10"/>
+          <p:cNvPr id="3" name="図 2"/>
           <p:cNvPicPr>
             <a:picLocks noChangeAspect="1"/>
           </p:cNvPicPr>
           <p:nvPr/>
         </p:nvPicPr>
-        <p:blipFill>
+        <p:blipFill rotWithShape="1">
           <a:blip r:embed="rId2"/>
-          <a:stretch>
-            <a:fillRect/>
-          </a:stretch>
+          <a:srcRect b="-4123"/>
+          <a:stretch/>
         </p:blipFill>
         <p:spPr>
           <a:xfrm>
-            <a:off x="1183341" y="1520608"/>
-            <a:ext cx="6472518" cy="4259334"/>
+            <a:off x="609600" y="1947935"/>
+            <a:ext cx="8360429" cy="3448818"/>
           </a:xfrm>
           <a:prstGeom prst="rect">
             <a:avLst/>
@@ -17919,7 +18155,7 @@
         </p:nvSpPr>
         <p:spPr>
           <a:xfrm>
-            <a:off x="3165067" y="3424518"/>
+            <a:off x="2382823" y="3147465"/>
             <a:ext cx="4437005" cy="359082"/>
           </a:xfrm>
           <a:prstGeom prst="rect">
@@ -17967,8 +18203,8 @@
         </p:nvSpPr>
         <p:spPr>
           <a:xfrm>
-            <a:off x="2802256" y="5217460"/>
-            <a:ext cx="2670958" cy="361086"/>
+            <a:off x="2043952" y="4827379"/>
+            <a:ext cx="5755341" cy="414873"/>
           </a:xfrm>
           <a:prstGeom prst="rect">
             <a:avLst/>

</xml_diff>

<commit_message>
Modify execution chapter #1817
</commit_message>
<xml_diff>
--- a/source/UnitTest/images_UnitTestGuide/materialUnitTestGuide.pptx
+++ b/source/UnitTest/images_UnitTestGuide/materialUnitTestGuide.pptx
@@ -7929,7 +7929,7 @@
       </p:grpSpPr>
       <p:pic>
         <p:nvPicPr>
-          <p:cNvPr id="3" name="図 2"/>
+          <p:cNvPr id="2" name="図 1"/>
           <p:cNvPicPr>
             <a:picLocks noChangeAspect="1"/>
           </p:cNvPicPr>
@@ -7943,8 +7943,8 @@
         </p:blipFill>
         <p:spPr>
           <a:xfrm>
-            <a:off x="728862" y="1962149"/>
-            <a:ext cx="7694320" cy="3685615"/>
+            <a:off x="1021976" y="1597769"/>
+            <a:ext cx="7082117" cy="4008235"/>
           </a:xfrm>
           <a:prstGeom prst="rect">
             <a:avLst/>

</xml_diff>